<commit_message>
combined PPT 1:49PM 07/04
combined PPT 1:49PM 07/04
</commit_message>
<xml_diff>
--- a/DataDynamos_BeerMarketingPresentation.pptx
+++ b/DataDynamos_BeerMarketingPresentation.pptx
@@ -4,6 +4,9 @@
   <p:sldMasterIdLst>
     <p:sldMasterId id="2147483689" r:id="rId1"/>
   </p:sldMasterIdLst>
+  <p:notesMasterIdLst>
+    <p:notesMasterId r:id="rId20"/>
+  </p:notesMasterIdLst>
   <p:sldIdLst>
     <p:sldId id="256" r:id="rId2"/>
     <p:sldId id="265" r:id="rId3"/>
@@ -15,11 +18,14 @@
     <p:sldId id="276" r:id="rId9"/>
     <p:sldId id="269" r:id="rId10"/>
     <p:sldId id="270" r:id="rId11"/>
-    <p:sldId id="277" r:id="rId12"/>
-    <p:sldId id="278" r:id="rId13"/>
-    <p:sldId id="279" r:id="rId14"/>
-    <p:sldId id="280" r:id="rId15"/>
-    <p:sldId id="281" r:id="rId16"/>
+    <p:sldId id="283" r:id="rId12"/>
+    <p:sldId id="284" r:id="rId13"/>
+    <p:sldId id="277" r:id="rId14"/>
+    <p:sldId id="285" r:id="rId15"/>
+    <p:sldId id="278" r:id="rId16"/>
+    <p:sldId id="279" r:id="rId17"/>
+    <p:sldId id="280" r:id="rId18"/>
+    <p:sldId id="281" r:id="rId19"/>
   </p:sldIdLst>
   <p:sldSz cx="12192000" cy="6858000"/>
   <p:notesSz cx="6858000" cy="9144000"/>
@@ -124,6 +130,439 @@
     </p:ext>
   </p:extLst>
 </p:presentation>
+</file>
+
+<file path=ppt/notesMasters/notesMaster1.xml><?xml version="1.0" encoding="utf-8"?>
+<p:notesMaster xmlns:a="http://schemas.openxmlformats.org/drawingml/2006/main" xmlns:r="http://schemas.openxmlformats.org/officeDocument/2006/relationships" xmlns:p="http://schemas.openxmlformats.org/presentationml/2006/main">
+  <p:cSld>
+    <p:bg>
+      <p:bgRef idx="1001">
+        <a:schemeClr val="bg1"/>
+      </p:bgRef>
+    </p:bg>
+    <p:spTree>
+      <p:nvGrpSpPr>
+        <p:cNvPr id="1" name=""/>
+        <p:cNvGrpSpPr/>
+        <p:nvPr/>
+      </p:nvGrpSpPr>
+      <p:grpSpPr>
+        <a:xfrm>
+          <a:off x="0" y="0"/>
+          <a:ext cx="0" cy="0"/>
+          <a:chOff x="0" y="0"/>
+          <a:chExt cx="0" cy="0"/>
+        </a:xfrm>
+      </p:grpSpPr>
+      <p:sp>
+        <p:nvSpPr>
+          <p:cNvPr id="2" name="Header Placeholder 1"/>
+          <p:cNvSpPr>
+            <a:spLocks noGrp="1"/>
+          </p:cNvSpPr>
+          <p:nvPr>
+            <p:ph type="hdr" sz="quarter"/>
+          </p:nvPr>
+        </p:nvSpPr>
+        <p:spPr>
+          <a:xfrm>
+            <a:off x="0" y="0"/>
+            <a:ext cx="2971800" cy="458788"/>
+          </a:xfrm>
+          <a:prstGeom prst="rect">
+            <a:avLst/>
+          </a:prstGeom>
+        </p:spPr>
+        <p:txBody>
+          <a:bodyPr vert="horz" lIns="91440" tIns="45720" rIns="91440" bIns="45720" rtlCol="0"/>
+          <a:lstStyle>
+            <a:lvl1pPr algn="l">
+              <a:defRPr sz="1200"/>
+            </a:lvl1pPr>
+          </a:lstStyle>
+          <a:p>
+            <a:endParaRPr lang="en-US"/>
+          </a:p>
+        </p:txBody>
+      </p:sp>
+      <p:sp>
+        <p:nvSpPr>
+          <p:cNvPr id="3" name="Date Placeholder 2"/>
+          <p:cNvSpPr>
+            <a:spLocks noGrp="1"/>
+          </p:cNvSpPr>
+          <p:nvPr>
+            <p:ph type="dt" idx="1"/>
+          </p:nvPr>
+        </p:nvSpPr>
+        <p:spPr>
+          <a:xfrm>
+            <a:off x="3884613" y="0"/>
+            <a:ext cx="2971800" cy="458788"/>
+          </a:xfrm>
+          <a:prstGeom prst="rect">
+            <a:avLst/>
+          </a:prstGeom>
+        </p:spPr>
+        <p:txBody>
+          <a:bodyPr vert="horz" lIns="91440" tIns="45720" rIns="91440" bIns="45720" rtlCol="0"/>
+          <a:lstStyle>
+            <a:lvl1pPr algn="r">
+              <a:defRPr sz="1200"/>
+            </a:lvl1pPr>
+          </a:lstStyle>
+          <a:p>
+            <a:fld id="{46C581E2-F6CA-4F4F-827B-26EF38B09560}" type="datetimeFigureOut">
+              <a:rPr lang="en-US" smtClean="0"/>
+              <a:t>7/4/20</a:t>
+            </a:fld>
+            <a:endParaRPr lang="en-US"/>
+          </a:p>
+        </p:txBody>
+      </p:sp>
+      <p:sp>
+        <p:nvSpPr>
+          <p:cNvPr id="4" name="Slide Image Placeholder 3"/>
+          <p:cNvSpPr>
+            <a:spLocks noGrp="1" noRot="1" noChangeAspect="1"/>
+          </p:cNvSpPr>
+          <p:nvPr>
+            <p:ph type="sldImg" idx="2"/>
+          </p:nvPr>
+        </p:nvSpPr>
+        <p:spPr>
+          <a:xfrm>
+            <a:off x="685800" y="1143000"/>
+            <a:ext cx="5486400" cy="3086100"/>
+          </a:xfrm>
+          <a:prstGeom prst="rect">
+            <a:avLst/>
+          </a:prstGeom>
+          <a:noFill/>
+          <a:ln w="12700">
+            <a:solidFill>
+              <a:prstClr val="black"/>
+            </a:solidFill>
+          </a:ln>
+        </p:spPr>
+        <p:txBody>
+          <a:bodyPr vert="horz" lIns="91440" tIns="45720" rIns="91440" bIns="45720" rtlCol="0" anchor="ctr"/>
+          <a:lstStyle/>
+          <a:p>
+            <a:endParaRPr lang="en-US"/>
+          </a:p>
+        </p:txBody>
+      </p:sp>
+      <p:sp>
+        <p:nvSpPr>
+          <p:cNvPr id="5" name="Notes Placeholder 4"/>
+          <p:cNvSpPr>
+            <a:spLocks noGrp="1"/>
+          </p:cNvSpPr>
+          <p:nvPr>
+            <p:ph type="body" sz="quarter" idx="3"/>
+          </p:nvPr>
+        </p:nvSpPr>
+        <p:spPr>
+          <a:xfrm>
+            <a:off x="685800" y="4400550"/>
+            <a:ext cx="5486400" cy="3600450"/>
+          </a:xfrm>
+          <a:prstGeom prst="rect">
+            <a:avLst/>
+          </a:prstGeom>
+        </p:spPr>
+        <p:txBody>
+          <a:bodyPr vert="horz" lIns="91440" tIns="45720" rIns="91440" bIns="45720" rtlCol="0"/>
+          <a:lstStyle/>
+          <a:p>
+            <a:pPr lvl="0"/>
+            <a:r>
+              <a:rPr lang="en-US"/>
+              <a:t>Click to edit Master text styles</a:t>
+            </a:r>
+          </a:p>
+          <a:p>
+            <a:pPr lvl="1"/>
+            <a:r>
+              <a:rPr lang="en-US"/>
+              <a:t>Second level</a:t>
+            </a:r>
+          </a:p>
+          <a:p>
+            <a:pPr lvl="2"/>
+            <a:r>
+              <a:rPr lang="en-US"/>
+              <a:t>Third level</a:t>
+            </a:r>
+          </a:p>
+          <a:p>
+            <a:pPr lvl="3"/>
+            <a:r>
+              <a:rPr lang="en-US"/>
+              <a:t>Fourth level</a:t>
+            </a:r>
+          </a:p>
+          <a:p>
+            <a:pPr lvl="4"/>
+            <a:r>
+              <a:rPr lang="en-US"/>
+              <a:t>Fifth level</a:t>
+            </a:r>
+          </a:p>
+        </p:txBody>
+      </p:sp>
+      <p:sp>
+        <p:nvSpPr>
+          <p:cNvPr id="6" name="Footer Placeholder 5"/>
+          <p:cNvSpPr>
+            <a:spLocks noGrp="1"/>
+          </p:cNvSpPr>
+          <p:nvPr>
+            <p:ph type="ftr" sz="quarter" idx="4"/>
+          </p:nvPr>
+        </p:nvSpPr>
+        <p:spPr>
+          <a:xfrm>
+            <a:off x="0" y="8685213"/>
+            <a:ext cx="2971800" cy="458787"/>
+          </a:xfrm>
+          <a:prstGeom prst="rect">
+            <a:avLst/>
+          </a:prstGeom>
+        </p:spPr>
+        <p:txBody>
+          <a:bodyPr vert="horz" lIns="91440" tIns="45720" rIns="91440" bIns="45720" rtlCol="0" anchor="b"/>
+          <a:lstStyle>
+            <a:lvl1pPr algn="l">
+              <a:defRPr sz="1200"/>
+            </a:lvl1pPr>
+          </a:lstStyle>
+          <a:p>
+            <a:endParaRPr lang="en-US"/>
+          </a:p>
+        </p:txBody>
+      </p:sp>
+      <p:sp>
+        <p:nvSpPr>
+          <p:cNvPr id="7" name="Slide Number Placeholder 6"/>
+          <p:cNvSpPr>
+            <a:spLocks noGrp="1"/>
+          </p:cNvSpPr>
+          <p:nvPr>
+            <p:ph type="sldNum" sz="quarter" idx="5"/>
+          </p:nvPr>
+        </p:nvSpPr>
+        <p:spPr>
+          <a:xfrm>
+            <a:off x="3884613" y="8685213"/>
+            <a:ext cx="2971800" cy="458787"/>
+          </a:xfrm>
+          <a:prstGeom prst="rect">
+            <a:avLst/>
+          </a:prstGeom>
+        </p:spPr>
+        <p:txBody>
+          <a:bodyPr vert="horz" lIns="91440" tIns="45720" rIns="91440" bIns="45720" rtlCol="0" anchor="b"/>
+          <a:lstStyle>
+            <a:lvl1pPr algn="r">
+              <a:defRPr sz="1200"/>
+            </a:lvl1pPr>
+          </a:lstStyle>
+          <a:p>
+            <a:fld id="{6B49369B-1F72-EB46-AB76-55900F398A9B}" type="slidenum">
+              <a:rPr lang="en-US" smtClean="0"/>
+              <a:t>‹#›</a:t>
+            </a:fld>
+            <a:endParaRPr lang="en-US"/>
+          </a:p>
+        </p:txBody>
+      </p:sp>
+    </p:spTree>
+    <p:extLst>
+      <p:ext uri="{BB962C8B-B14F-4D97-AF65-F5344CB8AC3E}">
+        <p14:creationId xmlns:p14="http://schemas.microsoft.com/office/powerpoint/2010/main" val="4277139815"/>
+      </p:ext>
+    </p:extLst>
+  </p:cSld>
+  <p:clrMap bg1="lt1" tx1="dk1" bg2="lt2" tx2="dk2" accent1="accent1" accent2="accent2" accent3="accent3" accent4="accent4" accent5="accent5" accent6="accent6" hlink="hlink" folHlink="folHlink"/>
+  <p:notesStyle>
+    <a:lvl1pPr marL="0" algn="l" defTabSz="914400" rtl="0" eaLnBrk="1" latinLnBrk="0" hangingPunct="1">
+      <a:defRPr sz="1200" kern="1200">
+        <a:solidFill>
+          <a:schemeClr val="tx1"/>
+        </a:solidFill>
+        <a:latin typeface="+mn-lt"/>
+        <a:ea typeface="+mn-ea"/>
+        <a:cs typeface="+mn-cs"/>
+      </a:defRPr>
+    </a:lvl1pPr>
+    <a:lvl2pPr marL="457200" algn="l" defTabSz="914400" rtl="0" eaLnBrk="1" latinLnBrk="0" hangingPunct="1">
+      <a:defRPr sz="1200" kern="1200">
+        <a:solidFill>
+          <a:schemeClr val="tx1"/>
+        </a:solidFill>
+        <a:latin typeface="+mn-lt"/>
+        <a:ea typeface="+mn-ea"/>
+        <a:cs typeface="+mn-cs"/>
+      </a:defRPr>
+    </a:lvl2pPr>
+    <a:lvl3pPr marL="914400" algn="l" defTabSz="914400" rtl="0" eaLnBrk="1" latinLnBrk="0" hangingPunct="1">
+      <a:defRPr sz="1200" kern="1200">
+        <a:solidFill>
+          <a:schemeClr val="tx1"/>
+        </a:solidFill>
+        <a:latin typeface="+mn-lt"/>
+        <a:ea typeface="+mn-ea"/>
+        <a:cs typeface="+mn-cs"/>
+      </a:defRPr>
+    </a:lvl3pPr>
+    <a:lvl4pPr marL="1371600" algn="l" defTabSz="914400" rtl="0" eaLnBrk="1" latinLnBrk="0" hangingPunct="1">
+      <a:defRPr sz="1200" kern="1200">
+        <a:solidFill>
+          <a:schemeClr val="tx1"/>
+        </a:solidFill>
+        <a:latin typeface="+mn-lt"/>
+        <a:ea typeface="+mn-ea"/>
+        <a:cs typeface="+mn-cs"/>
+      </a:defRPr>
+    </a:lvl4pPr>
+    <a:lvl5pPr marL="1828800" algn="l" defTabSz="914400" rtl="0" eaLnBrk="1" latinLnBrk="0" hangingPunct="1">
+      <a:defRPr sz="1200" kern="1200">
+        <a:solidFill>
+          <a:schemeClr val="tx1"/>
+        </a:solidFill>
+        <a:latin typeface="+mn-lt"/>
+        <a:ea typeface="+mn-ea"/>
+        <a:cs typeface="+mn-cs"/>
+      </a:defRPr>
+    </a:lvl5pPr>
+    <a:lvl6pPr marL="2286000" algn="l" defTabSz="914400" rtl="0" eaLnBrk="1" latinLnBrk="0" hangingPunct="1">
+      <a:defRPr sz="1200" kern="1200">
+        <a:solidFill>
+          <a:schemeClr val="tx1"/>
+        </a:solidFill>
+        <a:latin typeface="+mn-lt"/>
+        <a:ea typeface="+mn-ea"/>
+        <a:cs typeface="+mn-cs"/>
+      </a:defRPr>
+    </a:lvl6pPr>
+    <a:lvl7pPr marL="2743200" algn="l" defTabSz="914400" rtl="0" eaLnBrk="1" latinLnBrk="0" hangingPunct="1">
+      <a:defRPr sz="1200" kern="1200">
+        <a:solidFill>
+          <a:schemeClr val="tx1"/>
+        </a:solidFill>
+        <a:latin typeface="+mn-lt"/>
+        <a:ea typeface="+mn-ea"/>
+        <a:cs typeface="+mn-cs"/>
+      </a:defRPr>
+    </a:lvl7pPr>
+    <a:lvl8pPr marL="3200400" algn="l" defTabSz="914400" rtl="0" eaLnBrk="1" latinLnBrk="0" hangingPunct="1">
+      <a:defRPr sz="1200" kern="1200">
+        <a:solidFill>
+          <a:schemeClr val="tx1"/>
+        </a:solidFill>
+        <a:latin typeface="+mn-lt"/>
+        <a:ea typeface="+mn-ea"/>
+        <a:cs typeface="+mn-cs"/>
+      </a:defRPr>
+    </a:lvl8pPr>
+    <a:lvl9pPr marL="3657600" algn="l" defTabSz="914400" rtl="0" eaLnBrk="1" latinLnBrk="0" hangingPunct="1">
+      <a:defRPr sz="1200" kern="1200">
+        <a:solidFill>
+          <a:schemeClr val="tx1"/>
+        </a:solidFill>
+        <a:latin typeface="+mn-lt"/>
+        <a:ea typeface="+mn-ea"/>
+        <a:cs typeface="+mn-cs"/>
+      </a:defRPr>
+    </a:lvl9pPr>
+  </p:notesStyle>
+</p:notesMaster>
+</file>
+
+<file path=ppt/notesSlides/notesSlide1.xml><?xml version="1.0" encoding="utf-8"?>
+<p:notes xmlns:a="http://schemas.openxmlformats.org/drawingml/2006/main" xmlns:r="http://schemas.openxmlformats.org/officeDocument/2006/relationships" xmlns:p="http://schemas.openxmlformats.org/presentationml/2006/main">
+  <p:cSld>
+    <p:spTree>
+      <p:nvGrpSpPr>
+        <p:cNvPr id="1" name=""/>
+        <p:cNvGrpSpPr/>
+        <p:nvPr/>
+      </p:nvGrpSpPr>
+      <p:grpSpPr>
+        <a:xfrm>
+          <a:off x="0" y="0"/>
+          <a:ext cx="0" cy="0"/>
+          <a:chOff x="0" y="0"/>
+          <a:chExt cx="0" cy="0"/>
+        </a:xfrm>
+      </p:grpSpPr>
+      <p:sp>
+        <p:nvSpPr>
+          <p:cNvPr id="2" name="Slide Image Placeholder 1"/>
+          <p:cNvSpPr>
+            <a:spLocks noGrp="1" noRot="1" noChangeAspect="1"/>
+          </p:cNvSpPr>
+          <p:nvPr>
+            <p:ph type="sldImg"/>
+          </p:nvPr>
+        </p:nvSpPr>
+        <p:spPr/>
+      </p:sp>
+      <p:sp>
+        <p:nvSpPr>
+          <p:cNvPr id="3" name="Notes Placeholder 2"/>
+          <p:cNvSpPr>
+            <a:spLocks noGrp="1"/>
+          </p:cNvSpPr>
+          <p:nvPr>
+            <p:ph type="body" idx="1"/>
+          </p:nvPr>
+        </p:nvSpPr>
+        <p:spPr/>
+        <p:txBody>
+          <a:bodyPr/>
+          <a:lstStyle/>
+          <a:p>
+            <a:endParaRPr lang="en-US"/>
+          </a:p>
+        </p:txBody>
+      </p:sp>
+      <p:sp>
+        <p:nvSpPr>
+          <p:cNvPr id="4" name="Slide Number Placeholder 3"/>
+          <p:cNvSpPr>
+            <a:spLocks noGrp="1"/>
+          </p:cNvSpPr>
+          <p:nvPr>
+            <p:ph type="sldNum" sz="quarter" idx="5"/>
+          </p:nvPr>
+        </p:nvSpPr>
+        <p:spPr/>
+        <p:txBody>
+          <a:bodyPr/>
+          <a:lstStyle/>
+          <a:p>
+            <a:fld id="{0269A973-39E5-1E41-A65B-A6BE85E61D80}" type="slidenum">
+              <a:rPr lang="en-US" smtClean="0"/>
+              <a:t>11</a:t>
+            </a:fld>
+            <a:endParaRPr lang="en-US"/>
+          </a:p>
+        </p:txBody>
+      </p:sp>
+    </p:spTree>
+    <p:extLst>
+      <p:ext uri="{BB962C8B-B14F-4D97-AF65-F5344CB8AC3E}">
+        <p14:creationId xmlns:p14="http://schemas.microsoft.com/office/powerpoint/2010/main" val="3206264129"/>
+      </p:ext>
+    </p:extLst>
+  </p:cSld>
+  <p:clrMapOvr>
+    <a:masterClrMapping/>
+  </p:clrMapOvr>
+</p:notes>
 </file>
 
 <file path=ppt/slideLayouts/slideLayout1.xml><?xml version="1.0" encoding="utf-8"?>
@@ -852,7 +1291,7 @@
           <a:p>
             <a:fld id="{46CD8DB8-A9AF-874F-AADD-8C6B362313DF}" type="datetimeFigureOut">
               <a:rPr lang="en-US" smtClean="0"/>
-              <a:t>7/4/2020</a:t>
+              <a:t>7/4/20</a:t>
             </a:fld>
             <a:endParaRPr lang="en-US"/>
           </a:p>
@@ -1103,7 +1542,7 @@
           <a:p>
             <a:fld id="{46CD8DB8-A9AF-874F-AADD-8C6B362313DF}" type="datetimeFigureOut">
               <a:rPr lang="en-US" smtClean="0"/>
-              <a:t>7/4/2020</a:t>
+              <a:t>7/4/20</a:t>
             </a:fld>
             <a:endParaRPr lang="en-US"/>
           </a:p>
@@ -1417,7 +1856,7 @@
           <a:p>
             <a:fld id="{46CD8DB8-A9AF-874F-AADD-8C6B362313DF}" type="datetimeFigureOut">
               <a:rPr lang="en-US" smtClean="0"/>
-              <a:t>7/4/2020</a:t>
+              <a:t>7/4/20</a:t>
             </a:fld>
             <a:endParaRPr lang="en-US"/>
           </a:p>
@@ -1744,7 +2183,7 @@
           <a:p>
             <a:fld id="{46CD8DB8-A9AF-874F-AADD-8C6B362313DF}" type="datetimeFigureOut">
               <a:rPr lang="en-US" smtClean="0"/>
-              <a:t>7/4/2020</a:t>
+              <a:t>7/4/20</a:t>
             </a:fld>
             <a:endParaRPr lang="en-US"/>
           </a:p>
@@ -2058,7 +2497,7 @@
           <a:p>
             <a:fld id="{46CD8DB8-A9AF-874F-AADD-8C6B362313DF}" type="datetimeFigureOut">
               <a:rPr lang="en-US" smtClean="0"/>
-              <a:t>7/4/2020</a:t>
+              <a:t>7/4/20</a:t>
             </a:fld>
             <a:endParaRPr lang="en-US"/>
           </a:p>
@@ -2445,7 +2884,7 @@
           <a:p>
             <a:fld id="{46CD8DB8-A9AF-874F-AADD-8C6B362313DF}" type="datetimeFigureOut">
               <a:rPr lang="en-US" smtClean="0"/>
-              <a:t>7/4/2020</a:t>
+              <a:t>7/4/20</a:t>
             </a:fld>
             <a:endParaRPr lang="en-US"/>
           </a:p>
@@ -2615,7 +3054,7 @@
           <a:p>
             <a:fld id="{46CD8DB8-A9AF-874F-AADD-8C6B362313DF}" type="datetimeFigureOut">
               <a:rPr lang="en-US" smtClean="0"/>
-              <a:t>7/4/2020</a:t>
+              <a:t>7/4/20</a:t>
             </a:fld>
             <a:endParaRPr lang="en-US"/>
           </a:p>
@@ -2795,7 +3234,7 @@
           <a:p>
             <a:fld id="{46CD8DB8-A9AF-874F-AADD-8C6B362313DF}" type="datetimeFigureOut">
               <a:rPr lang="en-US" smtClean="0"/>
-              <a:t>7/4/2020</a:t>
+              <a:t>7/4/20</a:t>
             </a:fld>
             <a:endParaRPr lang="en-US"/>
           </a:p>
@@ -2965,7 +3404,7 @@
           <a:p>
             <a:fld id="{46CD8DB8-A9AF-874F-AADD-8C6B362313DF}" type="datetimeFigureOut">
               <a:rPr lang="en-US" smtClean="0"/>
-              <a:t>7/4/2020</a:t>
+              <a:t>7/4/20</a:t>
             </a:fld>
             <a:endParaRPr lang="en-US"/>
           </a:p>
@@ -3212,7 +3651,7 @@
           <a:p>
             <a:fld id="{46CD8DB8-A9AF-874F-AADD-8C6B362313DF}" type="datetimeFigureOut">
               <a:rPr lang="en-US" smtClean="0"/>
-              <a:t>7/4/2020</a:t>
+              <a:t>7/4/20</a:t>
             </a:fld>
             <a:endParaRPr lang="en-US"/>
           </a:p>
@@ -3444,7 +3883,7 @@
           <a:p>
             <a:fld id="{46CD8DB8-A9AF-874F-AADD-8C6B362313DF}" type="datetimeFigureOut">
               <a:rPr lang="en-US" smtClean="0"/>
-              <a:t>7/4/2020</a:t>
+              <a:t>7/4/20</a:t>
             </a:fld>
             <a:endParaRPr lang="en-US"/>
           </a:p>
@@ -3818,7 +4257,7 @@
           <a:p>
             <a:fld id="{46CD8DB8-A9AF-874F-AADD-8C6B362313DF}" type="datetimeFigureOut">
               <a:rPr lang="en-US" smtClean="0"/>
-              <a:t>7/4/2020</a:t>
+              <a:t>7/4/20</a:t>
             </a:fld>
             <a:endParaRPr lang="en-US"/>
           </a:p>
@@ -3941,7 +4380,7 @@
           <a:p>
             <a:fld id="{46CD8DB8-A9AF-874F-AADD-8C6B362313DF}" type="datetimeFigureOut">
               <a:rPr lang="en-US" smtClean="0"/>
-              <a:t>7/4/2020</a:t>
+              <a:t>7/4/20</a:t>
             </a:fld>
             <a:endParaRPr lang="en-US"/>
           </a:p>
@@ -4036,7 +4475,7 @@
           <a:p>
             <a:fld id="{46CD8DB8-A9AF-874F-AADD-8C6B362313DF}" type="datetimeFigureOut">
               <a:rPr lang="en-US" smtClean="0"/>
-              <a:t>7/4/2020</a:t>
+              <a:t>7/4/20</a:t>
             </a:fld>
             <a:endParaRPr lang="en-US"/>
           </a:p>
@@ -4291,7 +4730,7 @@
           <a:p>
             <a:fld id="{46CD8DB8-A9AF-874F-AADD-8C6B362313DF}" type="datetimeFigureOut">
               <a:rPr lang="en-US" smtClean="0"/>
-              <a:t>7/4/2020</a:t>
+              <a:t>7/4/20</a:t>
             </a:fld>
             <a:endParaRPr lang="en-US"/>
           </a:p>
@@ -4554,7 +4993,7 @@
           <a:p>
             <a:fld id="{46CD8DB8-A9AF-874F-AADD-8C6B362313DF}" type="datetimeFigureOut">
               <a:rPr lang="en-US" smtClean="0"/>
-              <a:t>7/4/2020</a:t>
+              <a:t>7/4/20</a:t>
             </a:fld>
             <a:endParaRPr lang="en-US"/>
           </a:p>
@@ -5299,7 +5738,7 @@
           <a:p>
             <a:fld id="{46CD8DB8-A9AF-874F-AADD-8C6B362313DF}" type="datetimeFigureOut">
               <a:rPr lang="en-US" smtClean="0"/>
-              <a:t>7/4/2020</a:t>
+              <a:t>7/4/20</a:t>
             </a:fld>
             <a:endParaRPr lang="en-US"/>
           </a:p>
@@ -6302,7 +6741,7 @@
           <p:cNvPr id="2" name="Title 1">
             <a:extLst>
               <a:ext uri="{FF2B5EF4-FFF2-40B4-BE49-F238E27FC236}">
-                <a16:creationId xmlns:a16="http://schemas.microsoft.com/office/drawing/2014/main" id="{E51B53D4-C9B2-4FA4-A5C5-D31BE8792EBE}"/>
+                <a16:creationId xmlns:a16="http://schemas.microsoft.com/office/drawing/2014/main" id="{A6A596C0-5519-C344-9618-EE89CB4789F0}"/>
               </a:ext>
             </a:extLst>
           </p:cNvPr>
@@ -6313,63 +6752,131 @@
             <p:ph type="title"/>
           </p:nvPr>
         </p:nvSpPr>
-        <p:spPr/>
-        <p:txBody>
-          <a:bodyPr/>
-          <a:lstStyle/>
-          <a:p>
-            <a:r>
-              <a:rPr lang="en-US" u="sng" dirty="0" err="1"/>
-              <a:t>Identifing</a:t>
-            </a:r>
-            <a:r>
-              <a:rPr lang="en-US" u="sng" dirty="0"/>
-              <a:t> New Market Opportunities</a:t>
+        <p:spPr>
+          <a:xfrm>
+            <a:off x="578058" y="384048"/>
+            <a:ext cx="7626096" cy="884682"/>
+          </a:xfrm>
+        </p:spPr>
+        <p:txBody>
+          <a:bodyPr vert="horz" lIns="68580" tIns="34290" rIns="68580" bIns="34290" rtlCol="0" anchor="ctr">
+            <a:normAutofit fontScale="90000"/>
+          </a:bodyPr>
+          <a:lstStyle/>
+          <a:p>
+            <a:br>
+              <a:rPr lang="en-US" sz="1875" u="sng" dirty="0"/>
+            </a:br>
+            <a:r>
+              <a:rPr lang="en-US" sz="2325" b="1" u="sng" dirty="0"/>
+              <a:t>Differences Between Beer IPA and Ale</a:t>
+            </a:r>
+            <a:br>
+              <a:rPr lang="en-US" sz="2325" b="1" u="sng" dirty="0"/>
+            </a:br>
+            <a:endParaRPr lang="en-US" sz="2325" b="1" u="sng" dirty="0"/>
+          </a:p>
+        </p:txBody>
+      </p:sp>
+      <p:sp>
+        <p:nvSpPr>
+          <p:cNvPr id="6" name="TextBox 5">
+            <a:extLst>
+              <a:ext uri="{FF2B5EF4-FFF2-40B4-BE49-F238E27FC236}">
+                <a16:creationId xmlns:a16="http://schemas.microsoft.com/office/drawing/2014/main" id="{AA6894F1-DE7D-E14A-82A2-DC0D12397D8B}"/>
+              </a:ext>
+            </a:extLst>
+          </p:cNvPr>
+          <p:cNvSpPr txBox="1"/>
+          <p:nvPr/>
+        </p:nvSpPr>
+        <p:spPr>
+          <a:xfrm>
+            <a:off x="650530" y="1043709"/>
+            <a:ext cx="5445470" cy="1363448"/>
+          </a:xfrm>
+          <a:prstGeom prst="rect">
+            <a:avLst/>
+          </a:prstGeom>
+        </p:spPr>
+        <p:txBody>
+          <a:bodyPr vert="horz" lIns="68580" tIns="34290" rIns="68580" bIns="34290" rtlCol="0" anchor="ctr">
+            <a:normAutofit/>
+          </a:bodyPr>
+          <a:lstStyle/>
+          <a:p>
+            <a:pPr marL="354330" indent="-342900">
+              <a:lnSpc>
+                <a:spcPct val="90000"/>
+              </a:lnSpc>
+              <a:spcAft>
+                <a:spcPts val="450"/>
+              </a:spcAft>
+              <a:buFont typeface="+mj-lt"/>
+              <a:buAutoNum type="arabicPeriod"/>
+            </a:pPr>
+            <a:r>
+              <a:rPr lang="en-US" sz="1500" dirty="0">
+                <a:solidFill>
+                  <a:srgbClr val="0070C0"/>
+                </a:solidFill>
+              </a:rPr>
+              <a:t>From the boxplot, Ale type of beers have higher IBU than IPA.  </a:t>
+            </a:r>
+          </a:p>
+          <a:p>
+            <a:pPr marL="354330" indent="-342900">
+              <a:lnSpc>
+                <a:spcPct val="90000"/>
+              </a:lnSpc>
+              <a:spcAft>
+                <a:spcPts val="450"/>
+              </a:spcAft>
+              <a:buFont typeface="+mj-lt"/>
+              <a:buAutoNum type="arabicPeriod"/>
+            </a:pPr>
+            <a:r>
+              <a:rPr lang="en-US" sz="1500" dirty="0">
+                <a:solidFill>
+                  <a:srgbClr val="0070C0"/>
+                </a:solidFill>
+              </a:rPr>
+              <a:t>Ale type of beers have higher ABV than IPA.</a:t>
+            </a:r>
+          </a:p>
+          <a:p>
+            <a:pPr marL="354330" indent="-342900">
+              <a:lnSpc>
+                <a:spcPct val="90000"/>
+              </a:lnSpc>
+              <a:spcAft>
+                <a:spcPts val="450"/>
+              </a:spcAft>
+              <a:buFont typeface="+mj-lt"/>
+              <a:buAutoNum type="arabicPeriod"/>
+            </a:pPr>
+            <a:r>
+              <a:rPr lang="en-US" sz="1500" dirty="0">
+                <a:solidFill>
+                  <a:srgbClr val="0070C0"/>
+                </a:solidFill>
+              </a:rPr>
+              <a:t>At the same level of ABV, IPA has higher IBU than Ale</a:t>
             </a:r>
           </a:p>
         </p:txBody>
       </p:sp>
       <p:pic>
         <p:nvPicPr>
-          <p:cNvPr id="4" name="Picture 3">
+          <p:cNvPr id="9" name="Picture 8">
             <a:extLst>
               <a:ext uri="{FF2B5EF4-FFF2-40B4-BE49-F238E27FC236}">
-                <a16:creationId xmlns:a16="http://schemas.microsoft.com/office/drawing/2014/main" id="{D1005941-A522-413B-B82E-A5DC62EFBD36}"/>
+                <a16:creationId xmlns:a16="http://schemas.microsoft.com/office/drawing/2014/main" id="{556C08EC-28CF-3B46-BA9A-25CFFAF96480}"/>
               </a:ext>
             </a:extLst>
           </p:cNvPr>
           <p:cNvPicPr>
-            <a:picLocks/>
-          </p:cNvPicPr>
-          <p:nvPr/>
-        </p:nvPicPr>
-        <p:blipFill>
-          <a:blip r:embed="rId2"/>
-          <a:stretch>
-            <a:fillRect/>
-          </a:stretch>
-        </p:blipFill>
-        <p:spPr>
-          <a:xfrm>
-            <a:off x="528450" y="2885938"/>
-            <a:ext cx="5486400" cy="3657600"/>
-          </a:xfrm>
-          <a:prstGeom prst="rect">
-            <a:avLst/>
-          </a:prstGeom>
-        </p:spPr>
-      </p:pic>
-      <p:pic>
-        <p:nvPicPr>
-          <p:cNvPr id="5" name="Picture 4">
-            <a:extLst>
-              <a:ext uri="{FF2B5EF4-FFF2-40B4-BE49-F238E27FC236}">
-                <a16:creationId xmlns:a16="http://schemas.microsoft.com/office/drawing/2014/main" id="{2591AC1E-0272-4F17-81C2-1BFED96901A3}"/>
-              </a:ext>
-            </a:extLst>
-          </p:cNvPr>
-          <p:cNvPicPr>
-            <a:picLocks/>
+            <a:picLocks noChangeAspect="1"/>
           </p:cNvPicPr>
           <p:nvPr/>
         </p:nvPicPr>
@@ -6381,62 +6888,78 @@
         </p:blipFill>
         <p:spPr>
           <a:xfrm>
-            <a:off x="6400439" y="2885937"/>
-            <a:ext cx="5486400" cy="3801001"/>
+            <a:off x="6675064" y="3855045"/>
+            <a:ext cx="4569199" cy="2949725"/>
           </a:xfrm>
           <a:prstGeom prst="rect">
             <a:avLst/>
           </a:prstGeom>
         </p:spPr>
       </p:pic>
-      <p:sp>
-        <p:nvSpPr>
-          <p:cNvPr id="6" name="TextBox 5">
+      <p:pic>
+        <p:nvPicPr>
+          <p:cNvPr id="11" name="Content Placeholder 3">
             <a:extLst>
               <a:ext uri="{FF2B5EF4-FFF2-40B4-BE49-F238E27FC236}">
-                <a16:creationId xmlns:a16="http://schemas.microsoft.com/office/drawing/2014/main" id="{3C11C7C1-3D9C-4FFC-A779-51A25BB3FB09}"/>
+                <a16:creationId xmlns:a16="http://schemas.microsoft.com/office/drawing/2014/main" id="{64BB5902-8FC3-904C-B203-8F2770CD49F1}"/>
               </a:ext>
             </a:extLst>
           </p:cNvPr>
-          <p:cNvSpPr txBox="1"/>
+          <p:cNvPicPr>
+            <a:picLocks noChangeAspect="1"/>
+          </p:cNvPicPr>
           <p:nvPr/>
-        </p:nvSpPr>
-        <p:spPr>
-          <a:xfrm>
-            <a:off x="457200" y="1295001"/>
-            <a:ext cx="9302620" cy="1384995"/>
+        </p:nvPicPr>
+        <p:blipFill>
+          <a:blip r:embed="rId4"/>
+          <a:stretch>
+            <a:fillRect/>
+          </a:stretch>
+        </p:blipFill>
+        <p:spPr>
+          <a:xfrm>
+            <a:off x="6654273" y="905977"/>
+            <a:ext cx="4589990" cy="2949068"/>
           </a:xfrm>
           <a:prstGeom prst="rect">
             <a:avLst/>
           </a:prstGeom>
-          <a:noFill/>
-        </p:spPr>
-        <p:txBody>
-          <a:bodyPr wrap="square" rtlCol="0">
-            <a:spAutoFit/>
-          </a:bodyPr>
-          <a:lstStyle/>
-          <a:p>
-            <a:pPr marL="457200" indent="-457200">
-              <a:buFont typeface="Wingdings" panose="05000000000000000000" pitchFamily="2" charset="2"/>
-              <a:buChar char="v"/>
-            </a:pPr>
-            <a:r>
-              <a:rPr lang="en-US" sz="2800" dirty="0">
-                <a:solidFill>
-                  <a:srgbClr val="0070C0"/>
-                </a:solidFill>
-              </a:rPr>
-              <a:t>Comparing the existing market as seen earlier with the population of the US may yields some interesting facts.</a:t>
-            </a:r>
-            <a:endParaRPr lang="en-US" sz="2000" dirty="0"/>
-          </a:p>
-        </p:txBody>
-      </p:sp>
+        </p:spPr>
+      </p:pic>
+      <p:pic>
+        <p:nvPicPr>
+          <p:cNvPr id="3" name="Picture 2">
+            <a:extLst>
+              <a:ext uri="{FF2B5EF4-FFF2-40B4-BE49-F238E27FC236}">
+                <a16:creationId xmlns:a16="http://schemas.microsoft.com/office/drawing/2014/main" id="{686CBFCC-531C-0B42-B77C-57224A785378}"/>
+              </a:ext>
+            </a:extLst>
+          </p:cNvPr>
+          <p:cNvPicPr>
+            <a:picLocks noChangeAspect="1"/>
+          </p:cNvPicPr>
+          <p:nvPr/>
+        </p:nvPicPr>
+        <p:blipFill>
+          <a:blip r:embed="rId5"/>
+          <a:stretch>
+            <a:fillRect/>
+          </a:stretch>
+        </p:blipFill>
+        <p:spPr>
+          <a:xfrm>
+            <a:off x="210365" y="2493654"/>
+            <a:ext cx="6142961" cy="3797785"/>
+          </a:xfrm>
+          <a:prstGeom prst="rect">
+            <a:avLst/>
+          </a:prstGeom>
+        </p:spPr>
+      </p:pic>
     </p:spTree>
     <p:extLst>
       <p:ext uri="{BB962C8B-B14F-4D97-AF65-F5344CB8AC3E}">
-        <p14:creationId xmlns:p14="http://schemas.microsoft.com/office/powerpoint/2010/main" val="3823678151"/>
+        <p14:creationId xmlns:p14="http://schemas.microsoft.com/office/powerpoint/2010/main" val="2490286831"/>
       </p:ext>
     </p:extLst>
   </p:cSld>
@@ -6468,7 +6991,7 @@
           <p:cNvPr id="2" name="Title 1">
             <a:extLst>
               <a:ext uri="{FF2B5EF4-FFF2-40B4-BE49-F238E27FC236}">
-                <a16:creationId xmlns:a16="http://schemas.microsoft.com/office/drawing/2014/main" id="{55167FB7-561B-44BD-92FD-36AA7788D7E1}"/>
+                <a16:creationId xmlns:a16="http://schemas.microsoft.com/office/drawing/2014/main" id="{72EBD38A-0394-8142-96BF-4EDE6A50119A}"/>
               </a:ext>
             </a:extLst>
           </p:cNvPr>
@@ -6481,28 +7004,136 @@
         </p:nvSpPr>
         <p:spPr>
           <a:xfrm>
-            <a:off x="459620" y="298580"/>
-            <a:ext cx="8596668" cy="777551"/>
-          </a:xfrm>
-        </p:spPr>
-        <p:txBody>
-          <a:bodyPr/>
-          <a:lstStyle/>
-          <a:p>
-            <a:r>
-              <a:rPr lang="en-US" u="sng" dirty="0"/>
-              <a:t>Using the Data to Focus on a Region</a:t>
-            </a:r>
-            <a:endParaRPr lang="en-US" dirty="0"/>
+            <a:off x="677334" y="609600"/>
+            <a:ext cx="8154150" cy="369332"/>
+          </a:xfrm>
+        </p:spPr>
+        <p:txBody>
+          <a:bodyPr>
+            <a:normAutofit fontScale="90000"/>
+          </a:bodyPr>
+          <a:lstStyle/>
+          <a:p>
+            <a:r>
+              <a:rPr lang="en-US" sz="2100" b="1" u="sng"/>
+              <a:t>Use KNN to Investigate the beer type with IBU and ABV</a:t>
+            </a:r>
+            <a:endParaRPr lang="en-US" sz="2100" b="1" u="sng" dirty="0"/>
           </a:p>
         </p:txBody>
       </p:sp>
       <p:pic>
         <p:nvPicPr>
-          <p:cNvPr id="4" name="Picture 3">
+          <p:cNvPr id="4" name="Content Placeholder 3">
             <a:extLst>
               <a:ext uri="{FF2B5EF4-FFF2-40B4-BE49-F238E27FC236}">
-                <a16:creationId xmlns:a16="http://schemas.microsoft.com/office/drawing/2014/main" id="{D912D7FB-7EF5-4E5F-9972-B9F256AC88D7}"/>
+                <a16:creationId xmlns:a16="http://schemas.microsoft.com/office/drawing/2014/main" id="{5EB9F10D-C6B0-C849-B26E-F1C5F877B8AB}"/>
+              </a:ext>
+            </a:extLst>
+          </p:cNvPr>
+          <p:cNvPicPr>
+            <a:picLocks noGrp="1" noChangeAspect="1"/>
+          </p:cNvPicPr>
+          <p:nvPr>
+            <p:ph idx="1"/>
+          </p:nvPr>
+        </p:nvPicPr>
+        <p:blipFill>
+          <a:blip r:embed="rId2"/>
+          <a:stretch>
+            <a:fillRect/>
+          </a:stretch>
+        </p:blipFill>
+        <p:spPr>
+          <a:xfrm>
+            <a:off x="6200775" y="2336006"/>
+            <a:ext cx="4857751" cy="2185988"/>
+          </a:xfrm>
+          <a:prstGeom prst="rect">
+            <a:avLst/>
+          </a:prstGeom>
+        </p:spPr>
+      </p:pic>
+      <p:sp>
+        <p:nvSpPr>
+          <p:cNvPr id="5" name="TextBox 4">
+            <a:extLst>
+              <a:ext uri="{FF2B5EF4-FFF2-40B4-BE49-F238E27FC236}">
+                <a16:creationId xmlns:a16="http://schemas.microsoft.com/office/drawing/2014/main" id="{4E86DFA8-479C-B448-933C-DD73DF4CD6A2}"/>
+              </a:ext>
+            </a:extLst>
+          </p:cNvPr>
+          <p:cNvSpPr txBox="1"/>
+          <p:nvPr/>
+        </p:nvSpPr>
+        <p:spPr>
+          <a:xfrm>
+            <a:off x="6817263" y="1838802"/>
+            <a:ext cx="3624775" cy="369332"/>
+          </a:xfrm>
+          <a:prstGeom prst="rect">
+            <a:avLst/>
+          </a:prstGeom>
+          <a:noFill/>
+        </p:spPr>
+        <p:txBody>
+          <a:bodyPr wrap="none" rtlCol="0">
+            <a:spAutoFit/>
+          </a:bodyPr>
+          <a:lstStyle/>
+          <a:p>
+            <a:r>
+              <a:rPr lang="en-US" dirty="0"/>
+              <a:t>Use ABV and IBU to get beer type</a:t>
+            </a:r>
+          </a:p>
+        </p:txBody>
+      </p:sp>
+      <p:sp>
+        <p:nvSpPr>
+          <p:cNvPr id="10" name="TextBox 9">
+            <a:extLst>
+              <a:ext uri="{FF2B5EF4-FFF2-40B4-BE49-F238E27FC236}">
+                <a16:creationId xmlns:a16="http://schemas.microsoft.com/office/drawing/2014/main" id="{9E0C9784-553B-3F4E-A64C-09B3063A832F}"/>
+              </a:ext>
+            </a:extLst>
+          </p:cNvPr>
+          <p:cNvSpPr txBox="1"/>
+          <p:nvPr/>
+        </p:nvSpPr>
+        <p:spPr>
+          <a:xfrm>
+            <a:off x="514350" y="5599054"/>
+            <a:ext cx="7831359" cy="338554"/>
+          </a:xfrm>
+          <a:prstGeom prst="rect">
+            <a:avLst/>
+          </a:prstGeom>
+          <a:noFill/>
+        </p:spPr>
+        <p:txBody>
+          <a:bodyPr wrap="square" rtlCol="0">
+            <a:spAutoFit/>
+          </a:bodyPr>
+          <a:lstStyle/>
+          <a:p>
+            <a:r>
+              <a:rPr lang="en-US" sz="1600" dirty="0">
+                <a:solidFill>
+                  <a:srgbClr val="0070C0"/>
+                </a:solidFill>
+              </a:rPr>
+              <a:t>The best mean accuracy is 0.859395, best K value is 5.</a:t>
+            </a:r>
+          </a:p>
+        </p:txBody>
+      </p:sp>
+      <p:pic>
+        <p:nvPicPr>
+          <p:cNvPr id="3" name="Picture 2">
+            <a:extLst>
+              <a:ext uri="{FF2B5EF4-FFF2-40B4-BE49-F238E27FC236}">
+                <a16:creationId xmlns:a16="http://schemas.microsoft.com/office/drawing/2014/main" id="{2B607B61-DD30-C14E-9121-3DF7F64F6A76}"/>
               </a:ext>
             </a:extLst>
           </p:cNvPr>
@@ -6512,132 +7143,25 @@
           <p:nvPr/>
         </p:nvPicPr>
         <p:blipFill>
-          <a:blip r:embed="rId2"/>
+          <a:blip r:embed="rId3"/>
           <a:stretch>
             <a:fillRect/>
           </a:stretch>
         </p:blipFill>
         <p:spPr>
           <a:xfrm>
-            <a:off x="4254353" y="1324946"/>
-            <a:ext cx="7758260" cy="5103845"/>
+            <a:off x="464097" y="1676298"/>
+            <a:ext cx="5631903" cy="3505403"/>
           </a:xfrm>
           <a:prstGeom prst="rect">
             <a:avLst/>
           </a:prstGeom>
         </p:spPr>
       </p:pic>
-      <p:sp>
-        <p:nvSpPr>
-          <p:cNvPr id="5" name="Oval 4">
-            <a:extLst>
-              <a:ext uri="{FF2B5EF4-FFF2-40B4-BE49-F238E27FC236}">
-                <a16:creationId xmlns:a16="http://schemas.microsoft.com/office/drawing/2014/main" id="{896E2EBA-5027-47D8-931C-805F122BAD74}"/>
-              </a:ext>
-            </a:extLst>
-          </p:cNvPr>
-          <p:cNvSpPr/>
-          <p:nvPr/>
-        </p:nvSpPr>
-        <p:spPr>
-          <a:xfrm>
-            <a:off x="7921063" y="3707363"/>
-            <a:ext cx="2373712" cy="1555102"/>
-          </a:xfrm>
-          <a:prstGeom prst="ellipse">
-            <a:avLst/>
-          </a:prstGeom>
-          <a:noFill/>
-        </p:spPr>
-        <p:style>
-          <a:lnRef idx="2">
-            <a:schemeClr val="accent1">
-              <a:shade val="50000"/>
-            </a:schemeClr>
-          </a:lnRef>
-          <a:fillRef idx="1">
-            <a:schemeClr val="accent1"/>
-          </a:fillRef>
-          <a:effectRef idx="0">
-            <a:schemeClr val="accent1"/>
-          </a:effectRef>
-          <a:fontRef idx="minor">
-            <a:schemeClr val="lt1"/>
-          </a:fontRef>
-        </p:style>
-        <p:txBody>
-          <a:bodyPr rtlCol="0" anchor="ctr"/>
-          <a:lstStyle/>
-          <a:p>
-            <a:pPr algn="ctr"/>
-            <a:endParaRPr lang="en-US"/>
-          </a:p>
-        </p:txBody>
-      </p:sp>
-      <p:sp>
-        <p:nvSpPr>
-          <p:cNvPr id="6" name="TextBox 5">
-            <a:extLst>
-              <a:ext uri="{FF2B5EF4-FFF2-40B4-BE49-F238E27FC236}">
-                <a16:creationId xmlns:a16="http://schemas.microsoft.com/office/drawing/2014/main" id="{067685B9-06AD-4D87-8B16-CA7A7AE0E32F}"/>
-              </a:ext>
-            </a:extLst>
-          </p:cNvPr>
-          <p:cNvSpPr txBox="1"/>
-          <p:nvPr/>
-        </p:nvSpPr>
-        <p:spPr>
-          <a:xfrm>
-            <a:off x="351061" y="1138576"/>
-            <a:ext cx="3495964" cy="5601533"/>
-          </a:xfrm>
-          <a:prstGeom prst="rect">
-            <a:avLst/>
-          </a:prstGeom>
-          <a:noFill/>
-        </p:spPr>
-        <p:txBody>
-          <a:bodyPr wrap="square" rtlCol="0">
-            <a:spAutoFit/>
-          </a:bodyPr>
-          <a:lstStyle/>
-          <a:p>
-            <a:pPr marL="457200" indent="-457200">
-              <a:buFont typeface="Wingdings" panose="05000000000000000000" pitchFamily="2" charset="2"/>
-              <a:buChar char="v"/>
-            </a:pPr>
-            <a:r>
-              <a:rPr lang="en-US" sz="2600" dirty="0">
-                <a:solidFill>
-                  <a:srgbClr val="0070C0"/>
-                </a:solidFill>
-              </a:rPr>
-              <a:t>Using US Census data along with our Market data, we created a factor showing Beers per Population.</a:t>
-            </a:r>
-          </a:p>
-          <a:p>
-            <a:pPr marL="457200" indent="-457200">
-              <a:buFont typeface="Wingdings" panose="05000000000000000000" pitchFamily="2" charset="2"/>
-              <a:buChar char="v"/>
-            </a:pPr>
-            <a:r>
-              <a:rPr lang="en-US" sz="2600" dirty="0">
-                <a:solidFill>
-                  <a:srgbClr val="0070C0"/>
-                </a:solidFill>
-              </a:rPr>
-              <a:t>Plotting this factor on a map shows a region that is underserved relative to the rest of the country.</a:t>
-            </a:r>
-          </a:p>
-          <a:p>
-            <a:endParaRPr lang="en-US" sz="2000" dirty="0"/>
-          </a:p>
-        </p:txBody>
-      </p:sp>
     </p:spTree>
     <p:extLst>
       <p:ext uri="{BB962C8B-B14F-4D97-AF65-F5344CB8AC3E}">
-        <p14:creationId xmlns:p14="http://schemas.microsoft.com/office/powerpoint/2010/main" val="3496687656"/>
+        <p14:creationId xmlns:p14="http://schemas.microsoft.com/office/powerpoint/2010/main" val="3928151316"/>
       </p:ext>
     </p:extLst>
   </p:cSld>
@@ -6669,7 +7193,7 @@
           <p:cNvPr id="2" name="Title 1">
             <a:extLst>
               <a:ext uri="{FF2B5EF4-FFF2-40B4-BE49-F238E27FC236}">
-                <a16:creationId xmlns:a16="http://schemas.microsoft.com/office/drawing/2014/main" id="{32B0D841-2534-41D1-B45E-71D5303C057B}"/>
+                <a16:creationId xmlns:a16="http://schemas.microsoft.com/office/drawing/2014/main" id="{E51B53D4-C9B2-4FA4-A5C5-D31BE8792EBE}"/>
               </a:ext>
             </a:extLst>
           </p:cNvPr>
@@ -6680,21 +7204,19 @@
             <p:ph type="title"/>
           </p:nvPr>
         </p:nvSpPr>
-        <p:spPr>
-          <a:xfrm>
-            <a:off x="472060" y="214085"/>
-            <a:ext cx="8596668" cy="1320800"/>
-          </a:xfrm>
-        </p:spPr>
+        <p:spPr/>
         <p:txBody>
           <a:bodyPr/>
           <a:lstStyle/>
           <a:p>
             <a:r>
+              <a:rPr lang="en-US" u="sng" dirty="0" err="1"/>
+              <a:t>Identifing</a:t>
+            </a:r>
+            <a:r>
               <a:rPr lang="en-US" u="sng" dirty="0"/>
-              <a:t>What is the Data Telling US?</a:t>
-            </a:r>
-            <a:endParaRPr lang="en-US" dirty="0"/>
+              <a:t> New Market Opportunities</a:t>
+            </a:r>
           </a:p>
         </p:txBody>
       </p:sp>
@@ -6703,12 +7225,12 @@
           <p:cNvPr id="4" name="Picture 3">
             <a:extLst>
               <a:ext uri="{FF2B5EF4-FFF2-40B4-BE49-F238E27FC236}">
-                <a16:creationId xmlns:a16="http://schemas.microsoft.com/office/drawing/2014/main" id="{91B6C823-9EBC-4716-820B-CCCB3514B861}"/>
+                <a16:creationId xmlns:a16="http://schemas.microsoft.com/office/drawing/2014/main" id="{D1005941-A522-413B-B82E-A5DC62EFBD36}"/>
               </a:ext>
             </a:extLst>
           </p:cNvPr>
           <p:cNvPicPr>
-            <a:picLocks noChangeAspect="1"/>
+            <a:picLocks/>
           </p:cNvPicPr>
           <p:nvPr/>
         </p:nvPicPr>
@@ -6720,72 +7242,25 @@
         </p:blipFill>
         <p:spPr>
           <a:xfrm>
-            <a:off x="472060" y="2699659"/>
-            <a:ext cx="5577607" cy="4099948"/>
+            <a:off x="528450" y="2885938"/>
+            <a:ext cx="5486400" cy="3657600"/>
           </a:xfrm>
           <a:prstGeom prst="rect">
             <a:avLst/>
           </a:prstGeom>
         </p:spPr>
       </p:pic>
-      <p:sp>
-        <p:nvSpPr>
-          <p:cNvPr id="5" name="Oval 4">
+      <p:pic>
+        <p:nvPicPr>
+          <p:cNvPr id="5" name="Picture 4">
             <a:extLst>
               <a:ext uri="{FF2B5EF4-FFF2-40B4-BE49-F238E27FC236}">
-                <a16:creationId xmlns:a16="http://schemas.microsoft.com/office/drawing/2014/main" id="{6A854814-9F5B-4833-AEB7-A64FE8B1A18A}"/>
-              </a:ext>
-            </a:extLst>
-          </p:cNvPr>
-          <p:cNvSpPr/>
-          <p:nvPr/>
-        </p:nvSpPr>
-        <p:spPr>
-          <a:xfrm>
-            <a:off x="3194064" y="5424537"/>
-            <a:ext cx="2152261" cy="1057470"/>
-          </a:xfrm>
-          <a:prstGeom prst="ellipse">
-            <a:avLst/>
-          </a:prstGeom>
-          <a:noFill/>
-        </p:spPr>
-        <p:style>
-          <a:lnRef idx="2">
-            <a:schemeClr val="accent1">
-              <a:shade val="50000"/>
-            </a:schemeClr>
-          </a:lnRef>
-          <a:fillRef idx="1">
-            <a:schemeClr val="accent1"/>
-          </a:fillRef>
-          <a:effectRef idx="0">
-            <a:schemeClr val="accent1"/>
-          </a:effectRef>
-          <a:fontRef idx="minor">
-            <a:schemeClr val="lt1"/>
-          </a:fontRef>
-        </p:style>
-        <p:txBody>
-          <a:bodyPr rtlCol="0" anchor="ctr"/>
-          <a:lstStyle/>
-          <a:p>
-            <a:pPr algn="ctr"/>
-            <a:endParaRPr lang="en-US"/>
-          </a:p>
-        </p:txBody>
-      </p:sp>
-      <p:pic>
-        <p:nvPicPr>
-          <p:cNvPr id="6" name="Picture 5">
-            <a:extLst>
-              <a:ext uri="{FF2B5EF4-FFF2-40B4-BE49-F238E27FC236}">
-                <a16:creationId xmlns:a16="http://schemas.microsoft.com/office/drawing/2014/main" id="{2A92A0B0-BD89-470F-B693-AB7C954240BC}"/>
+                <a16:creationId xmlns:a16="http://schemas.microsoft.com/office/drawing/2014/main" id="{2591AC1E-0272-4F17-81C2-1BFED96901A3}"/>
               </a:ext>
             </a:extLst>
           </p:cNvPr>
           <p:cNvPicPr>
-            <a:picLocks noChangeAspect="1"/>
+            <a:picLocks/>
           </p:cNvPicPr>
           <p:nvPr/>
         </p:nvPicPr>
@@ -6797,29 +7272,20 @@
         </p:blipFill>
         <p:spPr>
           <a:xfrm>
-            <a:off x="7042107" y="3154245"/>
-            <a:ext cx="2443180" cy="2667019"/>
+            <a:off x="6400439" y="2885937"/>
+            <a:ext cx="5486400" cy="3801001"/>
           </a:xfrm>
           <a:prstGeom prst="rect">
             <a:avLst/>
           </a:prstGeom>
-          <a:ln>
-            <a:solidFill>
-              <a:schemeClr val="accent1">
-                <a:shade val="50000"/>
-                <a:tint val="90000"/>
-                <a:satMod val="130000"/>
-              </a:schemeClr>
-            </a:solidFill>
-          </a:ln>
         </p:spPr>
       </p:pic>
       <p:sp>
         <p:nvSpPr>
-          <p:cNvPr id="7" name="TextBox 6">
+          <p:cNvPr id="6" name="TextBox 5">
             <a:extLst>
               <a:ext uri="{FF2B5EF4-FFF2-40B4-BE49-F238E27FC236}">
-                <a16:creationId xmlns:a16="http://schemas.microsoft.com/office/drawing/2014/main" id="{9237E10C-0EC4-4B03-BB35-A45938F2BFB6}"/>
+                <a16:creationId xmlns:a16="http://schemas.microsoft.com/office/drawing/2014/main" id="{3C11C7C1-3D9C-4FFC-A779-51A25BB3FB09}"/>
               </a:ext>
             </a:extLst>
           </p:cNvPr>
@@ -6828,8 +7294,8 @@
         </p:nvSpPr>
         <p:spPr>
           <a:xfrm>
-            <a:off x="183850" y="904728"/>
-            <a:ext cx="11629446" cy="2000548"/>
+            <a:off x="457200" y="1295001"/>
+            <a:ext cx="9302620" cy="1384995"/>
           </a:xfrm>
           <a:prstGeom prst="rect">
             <a:avLst/>
@@ -6847,29 +7313,13 @@
               <a:buChar char="v"/>
             </a:pPr>
             <a:r>
-              <a:rPr lang="en-US" sz="2600" dirty="0">
+              <a:rPr lang="en-US" sz="2800" dirty="0">
                 <a:solidFill>
                   <a:srgbClr val="0070C0"/>
                 </a:solidFill>
               </a:rPr>
-              <a:t>We are looking to target higher population areas which appear to be below what we would expect to see in Total Beers being sold.</a:t>
-            </a:r>
-          </a:p>
-          <a:p>
-            <a:pPr marL="457200" indent="-457200">
-              <a:buFont typeface="Wingdings" panose="05000000000000000000" pitchFamily="2" charset="2"/>
-              <a:buChar char="v"/>
-            </a:pPr>
-            <a:r>
-              <a:rPr lang="en-US" sz="2600" dirty="0">
-                <a:solidFill>
-                  <a:srgbClr val="0070C0"/>
-                </a:solidFill>
-              </a:rPr>
-              <a:t>When we target these areas showing below the regression line, we see many of our states highlighted in the previous map.</a:t>
-            </a:r>
-          </a:p>
-          <a:p>
+              <a:t>Comparing the existing market as seen earlier with the population of the US may yields some interesting facts.</a:t>
+            </a:r>
             <a:endParaRPr lang="en-US" sz="2000" dirty="0"/>
           </a:p>
         </p:txBody>
@@ -6877,7 +7327,7 @@
     </p:spTree>
     <p:extLst>
       <p:ext uri="{BB962C8B-B14F-4D97-AF65-F5344CB8AC3E}">
-        <p14:creationId xmlns:p14="http://schemas.microsoft.com/office/powerpoint/2010/main" val="1851363306"/>
+        <p14:creationId xmlns:p14="http://schemas.microsoft.com/office/powerpoint/2010/main" val="3823678151"/>
       </p:ext>
     </p:extLst>
   </p:cSld>
@@ -6904,6 +7354,646 @@
           <a:chExt cx="0" cy="0"/>
         </a:xfrm>
       </p:grpSpPr>
+      <p:pic>
+        <p:nvPicPr>
+          <p:cNvPr id="3" name="Picture 2">
+            <a:extLst>
+              <a:ext uri="{FF2B5EF4-FFF2-40B4-BE49-F238E27FC236}">
+                <a16:creationId xmlns:a16="http://schemas.microsoft.com/office/drawing/2014/main" id="{CB81EF2D-0B2A-0842-BDF2-5B4582C90B7E}"/>
+              </a:ext>
+            </a:extLst>
+          </p:cNvPr>
+          <p:cNvPicPr>
+            <a:picLocks noChangeAspect="1"/>
+          </p:cNvPicPr>
+          <p:nvPr/>
+        </p:nvPicPr>
+        <p:blipFill>
+          <a:blip r:embed="rId2"/>
+          <a:stretch>
+            <a:fillRect/>
+          </a:stretch>
+        </p:blipFill>
+        <p:spPr>
+          <a:xfrm>
+            <a:off x="5238046" y="2439761"/>
+            <a:ext cx="4599638" cy="2818720"/>
+          </a:xfrm>
+          <a:prstGeom prst="rect">
+            <a:avLst/>
+          </a:prstGeom>
+        </p:spPr>
+      </p:pic>
+      <p:sp>
+        <p:nvSpPr>
+          <p:cNvPr id="2" name="Title 1">
+            <a:extLst>
+              <a:ext uri="{FF2B5EF4-FFF2-40B4-BE49-F238E27FC236}">
+                <a16:creationId xmlns:a16="http://schemas.microsoft.com/office/drawing/2014/main" id="{55319219-CFFF-7746-8CC9-B1FC41EE8226}"/>
+              </a:ext>
+            </a:extLst>
+          </p:cNvPr>
+          <p:cNvSpPr>
+            <a:spLocks noGrp="1"/>
+          </p:cNvSpPr>
+          <p:nvPr>
+            <p:ph type="title"/>
+          </p:nvPr>
+        </p:nvSpPr>
+        <p:spPr>
+          <a:xfrm>
+            <a:off x="677334" y="609600"/>
+            <a:ext cx="8342488" cy="405353"/>
+          </a:xfrm>
+        </p:spPr>
+        <p:txBody>
+          <a:bodyPr>
+            <a:normAutofit fontScale="90000"/>
+          </a:bodyPr>
+          <a:lstStyle/>
+          <a:p>
+            <a:r>
+              <a:rPr lang="en-US" sz="2100" b="1" u="sng"/>
+              <a:t>Investigate the relationship with different variables</a:t>
+            </a:r>
+            <a:endParaRPr lang="en-US" sz="2100" b="1" u="sng" dirty="0"/>
+          </a:p>
+        </p:txBody>
+      </p:sp>
+      <p:pic>
+        <p:nvPicPr>
+          <p:cNvPr id="4" name="Content Placeholder 3">
+            <a:extLst>
+              <a:ext uri="{FF2B5EF4-FFF2-40B4-BE49-F238E27FC236}">
+                <a16:creationId xmlns:a16="http://schemas.microsoft.com/office/drawing/2014/main" id="{58789D2C-8CA1-BE45-A875-AD3957137629}"/>
+              </a:ext>
+            </a:extLst>
+          </p:cNvPr>
+          <p:cNvPicPr>
+            <a:picLocks noGrp="1" noChangeAspect="1"/>
+          </p:cNvPicPr>
+          <p:nvPr>
+            <p:ph idx="1"/>
+          </p:nvPr>
+        </p:nvPicPr>
+        <p:blipFill>
+          <a:blip r:embed="rId3"/>
+          <a:stretch>
+            <a:fillRect/>
+          </a:stretch>
+        </p:blipFill>
+        <p:spPr>
+          <a:xfrm>
+            <a:off x="269700" y="1409740"/>
+            <a:ext cx="4968345" cy="4354609"/>
+          </a:xfrm>
+          <a:prstGeom prst="rect">
+            <a:avLst/>
+          </a:prstGeom>
+        </p:spPr>
+      </p:pic>
+      <p:sp>
+        <p:nvSpPr>
+          <p:cNvPr id="5" name="TextBox 4">
+            <a:extLst>
+              <a:ext uri="{FF2B5EF4-FFF2-40B4-BE49-F238E27FC236}">
+                <a16:creationId xmlns:a16="http://schemas.microsoft.com/office/drawing/2014/main" id="{6B86F66E-8A10-CF4E-8845-2B710B9C856B}"/>
+              </a:ext>
+            </a:extLst>
+          </p:cNvPr>
+          <p:cNvSpPr txBox="1"/>
+          <p:nvPr/>
+        </p:nvSpPr>
+        <p:spPr>
+          <a:xfrm>
+            <a:off x="396125" y="5832901"/>
+            <a:ext cx="7754453" cy="861410"/>
+          </a:xfrm>
+          <a:prstGeom prst="rect">
+            <a:avLst/>
+          </a:prstGeom>
+          <a:noFill/>
+        </p:spPr>
+        <p:txBody>
+          <a:bodyPr wrap="square" rtlCol="0">
+            <a:spAutoFit/>
+          </a:bodyPr>
+          <a:lstStyle/>
+          <a:p>
+            <a:r>
+              <a:rPr lang="en-US" sz="1600" dirty="0">
+                <a:solidFill>
+                  <a:srgbClr val="0070C0"/>
+                </a:solidFill>
+              </a:rPr>
+              <a:t>In order to find the opportunities from this data, first we checked these relationships </a:t>
+            </a:r>
+            <a:r>
+              <a:rPr lang="en-US" sz="1600" dirty="0" err="1">
+                <a:solidFill>
+                  <a:srgbClr val="0070C0"/>
+                </a:solidFill>
+              </a:rPr>
+              <a:t>winthin</a:t>
+            </a:r>
+            <a:r>
+              <a:rPr lang="en-US" sz="1600" dirty="0">
+                <a:solidFill>
+                  <a:srgbClr val="0070C0"/>
+                </a:solidFill>
+              </a:rPr>
+              <a:t> different variables. We would like to predict if there are some </a:t>
+            </a:r>
+            <a:r>
+              <a:rPr lang="en-US" sz="1600" dirty="0" err="1">
+                <a:solidFill>
+                  <a:srgbClr val="0070C0"/>
+                </a:solidFill>
+              </a:rPr>
+              <a:t>relathinship</a:t>
+            </a:r>
+            <a:r>
+              <a:rPr lang="en-US" sz="1600" dirty="0">
+                <a:solidFill>
+                  <a:srgbClr val="0070C0"/>
+                </a:solidFill>
+              </a:rPr>
+              <a:t> within Income, Population, beer type.</a:t>
+            </a:r>
+          </a:p>
+        </p:txBody>
+      </p:sp>
+    </p:spTree>
+    <p:extLst>
+      <p:ext uri="{BB962C8B-B14F-4D97-AF65-F5344CB8AC3E}">
+        <p14:creationId xmlns:p14="http://schemas.microsoft.com/office/powerpoint/2010/main" val="2995154348"/>
+      </p:ext>
+    </p:extLst>
+  </p:cSld>
+  <p:clrMapOvr>
+    <a:masterClrMapping/>
+  </p:clrMapOvr>
+</p:sld>
+</file>
+
+<file path=ppt/slides/slide15.xml><?xml version="1.0" encoding="utf-8"?>
+<p:sld xmlns:a="http://schemas.openxmlformats.org/drawingml/2006/main" xmlns:r="http://schemas.openxmlformats.org/officeDocument/2006/relationships" xmlns:p="http://schemas.openxmlformats.org/presentationml/2006/main">
+  <p:cSld>
+    <p:spTree>
+      <p:nvGrpSpPr>
+        <p:cNvPr id="1" name=""/>
+        <p:cNvGrpSpPr/>
+        <p:nvPr/>
+      </p:nvGrpSpPr>
+      <p:grpSpPr>
+        <a:xfrm>
+          <a:off x="0" y="0"/>
+          <a:ext cx="0" cy="0"/>
+          <a:chOff x="0" y="0"/>
+          <a:chExt cx="0" cy="0"/>
+        </a:xfrm>
+      </p:grpSpPr>
+      <p:sp>
+        <p:nvSpPr>
+          <p:cNvPr id="2" name="Title 1">
+            <a:extLst>
+              <a:ext uri="{FF2B5EF4-FFF2-40B4-BE49-F238E27FC236}">
+                <a16:creationId xmlns:a16="http://schemas.microsoft.com/office/drawing/2014/main" id="{55167FB7-561B-44BD-92FD-36AA7788D7E1}"/>
+              </a:ext>
+            </a:extLst>
+          </p:cNvPr>
+          <p:cNvSpPr>
+            <a:spLocks noGrp="1"/>
+          </p:cNvSpPr>
+          <p:nvPr>
+            <p:ph type="title"/>
+          </p:nvPr>
+        </p:nvSpPr>
+        <p:spPr>
+          <a:xfrm>
+            <a:off x="459620" y="298580"/>
+            <a:ext cx="8596668" cy="777551"/>
+          </a:xfrm>
+        </p:spPr>
+        <p:txBody>
+          <a:bodyPr/>
+          <a:lstStyle/>
+          <a:p>
+            <a:r>
+              <a:rPr lang="en-US" u="sng" dirty="0"/>
+              <a:t>Using the Data to Focus on a Region</a:t>
+            </a:r>
+            <a:endParaRPr lang="en-US" dirty="0"/>
+          </a:p>
+        </p:txBody>
+      </p:sp>
+      <p:pic>
+        <p:nvPicPr>
+          <p:cNvPr id="4" name="Picture 3">
+            <a:extLst>
+              <a:ext uri="{FF2B5EF4-FFF2-40B4-BE49-F238E27FC236}">
+                <a16:creationId xmlns:a16="http://schemas.microsoft.com/office/drawing/2014/main" id="{D912D7FB-7EF5-4E5F-9972-B9F256AC88D7}"/>
+              </a:ext>
+            </a:extLst>
+          </p:cNvPr>
+          <p:cNvPicPr>
+            <a:picLocks noChangeAspect="1"/>
+          </p:cNvPicPr>
+          <p:nvPr/>
+        </p:nvPicPr>
+        <p:blipFill>
+          <a:blip r:embed="rId2"/>
+          <a:stretch>
+            <a:fillRect/>
+          </a:stretch>
+        </p:blipFill>
+        <p:spPr>
+          <a:xfrm>
+            <a:off x="4254353" y="1324946"/>
+            <a:ext cx="7758260" cy="5103845"/>
+          </a:xfrm>
+          <a:prstGeom prst="rect">
+            <a:avLst/>
+          </a:prstGeom>
+        </p:spPr>
+      </p:pic>
+      <p:sp>
+        <p:nvSpPr>
+          <p:cNvPr id="5" name="Oval 4">
+            <a:extLst>
+              <a:ext uri="{FF2B5EF4-FFF2-40B4-BE49-F238E27FC236}">
+                <a16:creationId xmlns:a16="http://schemas.microsoft.com/office/drawing/2014/main" id="{896E2EBA-5027-47D8-931C-805F122BAD74}"/>
+              </a:ext>
+            </a:extLst>
+          </p:cNvPr>
+          <p:cNvSpPr/>
+          <p:nvPr/>
+        </p:nvSpPr>
+        <p:spPr>
+          <a:xfrm>
+            <a:off x="7921063" y="3707363"/>
+            <a:ext cx="2373712" cy="1555102"/>
+          </a:xfrm>
+          <a:prstGeom prst="ellipse">
+            <a:avLst/>
+          </a:prstGeom>
+          <a:noFill/>
+        </p:spPr>
+        <p:style>
+          <a:lnRef idx="2">
+            <a:schemeClr val="accent1">
+              <a:shade val="50000"/>
+            </a:schemeClr>
+          </a:lnRef>
+          <a:fillRef idx="1">
+            <a:schemeClr val="accent1"/>
+          </a:fillRef>
+          <a:effectRef idx="0">
+            <a:schemeClr val="accent1"/>
+          </a:effectRef>
+          <a:fontRef idx="minor">
+            <a:schemeClr val="lt1"/>
+          </a:fontRef>
+        </p:style>
+        <p:txBody>
+          <a:bodyPr rtlCol="0" anchor="ctr"/>
+          <a:lstStyle/>
+          <a:p>
+            <a:pPr algn="ctr"/>
+            <a:endParaRPr lang="en-US"/>
+          </a:p>
+        </p:txBody>
+      </p:sp>
+      <p:sp>
+        <p:nvSpPr>
+          <p:cNvPr id="6" name="TextBox 5">
+            <a:extLst>
+              <a:ext uri="{FF2B5EF4-FFF2-40B4-BE49-F238E27FC236}">
+                <a16:creationId xmlns:a16="http://schemas.microsoft.com/office/drawing/2014/main" id="{067685B9-06AD-4D87-8B16-CA7A7AE0E32F}"/>
+              </a:ext>
+            </a:extLst>
+          </p:cNvPr>
+          <p:cNvSpPr txBox="1"/>
+          <p:nvPr/>
+        </p:nvSpPr>
+        <p:spPr>
+          <a:xfrm>
+            <a:off x="351061" y="1138576"/>
+            <a:ext cx="3495964" cy="5601533"/>
+          </a:xfrm>
+          <a:prstGeom prst="rect">
+            <a:avLst/>
+          </a:prstGeom>
+          <a:noFill/>
+        </p:spPr>
+        <p:txBody>
+          <a:bodyPr wrap="square" rtlCol="0">
+            <a:spAutoFit/>
+          </a:bodyPr>
+          <a:lstStyle/>
+          <a:p>
+            <a:pPr marL="457200" indent="-457200">
+              <a:buFont typeface="Wingdings" panose="05000000000000000000" pitchFamily="2" charset="2"/>
+              <a:buChar char="v"/>
+            </a:pPr>
+            <a:r>
+              <a:rPr lang="en-US" sz="2600" dirty="0">
+                <a:solidFill>
+                  <a:srgbClr val="0070C0"/>
+                </a:solidFill>
+              </a:rPr>
+              <a:t>Using US Census data along with our Market data, we created a factor showing Beers per Population.</a:t>
+            </a:r>
+          </a:p>
+          <a:p>
+            <a:pPr marL="457200" indent="-457200">
+              <a:buFont typeface="Wingdings" panose="05000000000000000000" pitchFamily="2" charset="2"/>
+              <a:buChar char="v"/>
+            </a:pPr>
+            <a:r>
+              <a:rPr lang="en-US" sz="2600" dirty="0">
+                <a:solidFill>
+                  <a:srgbClr val="0070C0"/>
+                </a:solidFill>
+              </a:rPr>
+              <a:t>Plotting this factor on a map shows a region that is underserved relative to the rest of the country.</a:t>
+            </a:r>
+          </a:p>
+          <a:p>
+            <a:endParaRPr lang="en-US" sz="2000" dirty="0"/>
+          </a:p>
+        </p:txBody>
+      </p:sp>
+    </p:spTree>
+    <p:extLst>
+      <p:ext uri="{BB962C8B-B14F-4D97-AF65-F5344CB8AC3E}">
+        <p14:creationId xmlns:p14="http://schemas.microsoft.com/office/powerpoint/2010/main" val="3496687656"/>
+      </p:ext>
+    </p:extLst>
+  </p:cSld>
+  <p:clrMapOvr>
+    <a:masterClrMapping/>
+  </p:clrMapOvr>
+</p:sld>
+</file>
+
+<file path=ppt/slides/slide16.xml><?xml version="1.0" encoding="utf-8"?>
+<p:sld xmlns:a="http://schemas.openxmlformats.org/drawingml/2006/main" xmlns:r="http://schemas.openxmlformats.org/officeDocument/2006/relationships" xmlns:p="http://schemas.openxmlformats.org/presentationml/2006/main">
+  <p:cSld>
+    <p:spTree>
+      <p:nvGrpSpPr>
+        <p:cNvPr id="1" name=""/>
+        <p:cNvGrpSpPr/>
+        <p:nvPr/>
+      </p:nvGrpSpPr>
+      <p:grpSpPr>
+        <a:xfrm>
+          <a:off x="0" y="0"/>
+          <a:ext cx="0" cy="0"/>
+          <a:chOff x="0" y="0"/>
+          <a:chExt cx="0" cy="0"/>
+        </a:xfrm>
+      </p:grpSpPr>
+      <p:sp>
+        <p:nvSpPr>
+          <p:cNvPr id="2" name="Title 1">
+            <a:extLst>
+              <a:ext uri="{FF2B5EF4-FFF2-40B4-BE49-F238E27FC236}">
+                <a16:creationId xmlns:a16="http://schemas.microsoft.com/office/drawing/2014/main" id="{32B0D841-2534-41D1-B45E-71D5303C057B}"/>
+              </a:ext>
+            </a:extLst>
+          </p:cNvPr>
+          <p:cNvSpPr>
+            <a:spLocks noGrp="1"/>
+          </p:cNvSpPr>
+          <p:nvPr>
+            <p:ph type="title"/>
+          </p:nvPr>
+        </p:nvSpPr>
+        <p:spPr>
+          <a:xfrm>
+            <a:off x="472060" y="214085"/>
+            <a:ext cx="8596668" cy="1320800"/>
+          </a:xfrm>
+        </p:spPr>
+        <p:txBody>
+          <a:bodyPr/>
+          <a:lstStyle/>
+          <a:p>
+            <a:r>
+              <a:rPr lang="en-US" u="sng" dirty="0"/>
+              <a:t>What is the Data Telling US?</a:t>
+            </a:r>
+            <a:endParaRPr lang="en-US" dirty="0"/>
+          </a:p>
+        </p:txBody>
+      </p:sp>
+      <p:pic>
+        <p:nvPicPr>
+          <p:cNvPr id="4" name="Picture 3">
+            <a:extLst>
+              <a:ext uri="{FF2B5EF4-FFF2-40B4-BE49-F238E27FC236}">
+                <a16:creationId xmlns:a16="http://schemas.microsoft.com/office/drawing/2014/main" id="{91B6C823-9EBC-4716-820B-CCCB3514B861}"/>
+              </a:ext>
+            </a:extLst>
+          </p:cNvPr>
+          <p:cNvPicPr>
+            <a:picLocks noChangeAspect="1"/>
+          </p:cNvPicPr>
+          <p:nvPr/>
+        </p:nvPicPr>
+        <p:blipFill>
+          <a:blip r:embed="rId2"/>
+          <a:stretch>
+            <a:fillRect/>
+          </a:stretch>
+        </p:blipFill>
+        <p:spPr>
+          <a:xfrm>
+            <a:off x="472060" y="2699659"/>
+            <a:ext cx="5577607" cy="4099948"/>
+          </a:xfrm>
+          <a:prstGeom prst="rect">
+            <a:avLst/>
+          </a:prstGeom>
+        </p:spPr>
+      </p:pic>
+      <p:sp>
+        <p:nvSpPr>
+          <p:cNvPr id="5" name="Oval 4">
+            <a:extLst>
+              <a:ext uri="{FF2B5EF4-FFF2-40B4-BE49-F238E27FC236}">
+                <a16:creationId xmlns:a16="http://schemas.microsoft.com/office/drawing/2014/main" id="{6A854814-9F5B-4833-AEB7-A64FE8B1A18A}"/>
+              </a:ext>
+            </a:extLst>
+          </p:cNvPr>
+          <p:cNvSpPr/>
+          <p:nvPr/>
+        </p:nvSpPr>
+        <p:spPr>
+          <a:xfrm>
+            <a:off x="3194064" y="5424537"/>
+            <a:ext cx="2152261" cy="1057470"/>
+          </a:xfrm>
+          <a:prstGeom prst="ellipse">
+            <a:avLst/>
+          </a:prstGeom>
+          <a:noFill/>
+        </p:spPr>
+        <p:style>
+          <a:lnRef idx="2">
+            <a:schemeClr val="accent1">
+              <a:shade val="50000"/>
+            </a:schemeClr>
+          </a:lnRef>
+          <a:fillRef idx="1">
+            <a:schemeClr val="accent1"/>
+          </a:fillRef>
+          <a:effectRef idx="0">
+            <a:schemeClr val="accent1"/>
+          </a:effectRef>
+          <a:fontRef idx="minor">
+            <a:schemeClr val="lt1"/>
+          </a:fontRef>
+        </p:style>
+        <p:txBody>
+          <a:bodyPr rtlCol="0" anchor="ctr"/>
+          <a:lstStyle/>
+          <a:p>
+            <a:pPr algn="ctr"/>
+            <a:endParaRPr lang="en-US"/>
+          </a:p>
+        </p:txBody>
+      </p:sp>
+      <p:pic>
+        <p:nvPicPr>
+          <p:cNvPr id="6" name="Picture 5">
+            <a:extLst>
+              <a:ext uri="{FF2B5EF4-FFF2-40B4-BE49-F238E27FC236}">
+                <a16:creationId xmlns:a16="http://schemas.microsoft.com/office/drawing/2014/main" id="{2A92A0B0-BD89-470F-B693-AB7C954240BC}"/>
+              </a:ext>
+            </a:extLst>
+          </p:cNvPr>
+          <p:cNvPicPr>
+            <a:picLocks noChangeAspect="1"/>
+          </p:cNvPicPr>
+          <p:nvPr/>
+        </p:nvPicPr>
+        <p:blipFill>
+          <a:blip r:embed="rId3"/>
+          <a:stretch>
+            <a:fillRect/>
+          </a:stretch>
+        </p:blipFill>
+        <p:spPr>
+          <a:xfrm>
+            <a:off x="7042107" y="3154245"/>
+            <a:ext cx="2443180" cy="2667019"/>
+          </a:xfrm>
+          <a:prstGeom prst="rect">
+            <a:avLst/>
+          </a:prstGeom>
+          <a:ln>
+            <a:solidFill>
+              <a:schemeClr val="accent1">
+                <a:shade val="50000"/>
+                <a:tint val="90000"/>
+                <a:satMod val="130000"/>
+              </a:schemeClr>
+            </a:solidFill>
+          </a:ln>
+        </p:spPr>
+      </p:pic>
+      <p:sp>
+        <p:nvSpPr>
+          <p:cNvPr id="7" name="TextBox 6">
+            <a:extLst>
+              <a:ext uri="{FF2B5EF4-FFF2-40B4-BE49-F238E27FC236}">
+                <a16:creationId xmlns:a16="http://schemas.microsoft.com/office/drawing/2014/main" id="{9237E10C-0EC4-4B03-BB35-A45938F2BFB6}"/>
+              </a:ext>
+            </a:extLst>
+          </p:cNvPr>
+          <p:cNvSpPr txBox="1"/>
+          <p:nvPr/>
+        </p:nvSpPr>
+        <p:spPr>
+          <a:xfrm>
+            <a:off x="183850" y="904728"/>
+            <a:ext cx="11629446" cy="2000548"/>
+          </a:xfrm>
+          <a:prstGeom prst="rect">
+            <a:avLst/>
+          </a:prstGeom>
+          <a:noFill/>
+        </p:spPr>
+        <p:txBody>
+          <a:bodyPr wrap="square" rtlCol="0">
+            <a:spAutoFit/>
+          </a:bodyPr>
+          <a:lstStyle/>
+          <a:p>
+            <a:pPr marL="457200" indent="-457200">
+              <a:buFont typeface="Wingdings" panose="05000000000000000000" pitchFamily="2" charset="2"/>
+              <a:buChar char="v"/>
+            </a:pPr>
+            <a:r>
+              <a:rPr lang="en-US" sz="2600" dirty="0">
+                <a:solidFill>
+                  <a:srgbClr val="0070C0"/>
+                </a:solidFill>
+              </a:rPr>
+              <a:t>We are looking to target higher population areas which appear to be below what we would expect to see in Total Beers being sold.</a:t>
+            </a:r>
+          </a:p>
+          <a:p>
+            <a:pPr marL="457200" indent="-457200">
+              <a:buFont typeface="Wingdings" panose="05000000000000000000" pitchFamily="2" charset="2"/>
+              <a:buChar char="v"/>
+            </a:pPr>
+            <a:r>
+              <a:rPr lang="en-US" sz="2600" dirty="0">
+                <a:solidFill>
+                  <a:srgbClr val="0070C0"/>
+                </a:solidFill>
+              </a:rPr>
+              <a:t>When we target these areas showing below the regression line, we see many of our states highlighted in the previous map.</a:t>
+            </a:r>
+          </a:p>
+          <a:p>
+            <a:endParaRPr lang="en-US" sz="2000" dirty="0"/>
+          </a:p>
+        </p:txBody>
+      </p:sp>
+    </p:spTree>
+    <p:extLst>
+      <p:ext uri="{BB962C8B-B14F-4D97-AF65-F5344CB8AC3E}">
+        <p14:creationId xmlns:p14="http://schemas.microsoft.com/office/powerpoint/2010/main" val="1851363306"/>
+      </p:ext>
+    </p:extLst>
+  </p:cSld>
+  <p:clrMapOvr>
+    <a:masterClrMapping/>
+  </p:clrMapOvr>
+</p:sld>
+</file>
+
+<file path=ppt/slides/slide17.xml><?xml version="1.0" encoding="utf-8"?>
+<p:sld xmlns:a="http://schemas.openxmlformats.org/drawingml/2006/main" xmlns:r="http://schemas.openxmlformats.org/officeDocument/2006/relationships" xmlns:p="http://schemas.openxmlformats.org/presentationml/2006/main">
+  <p:cSld>
+    <p:spTree>
+      <p:nvGrpSpPr>
+        <p:cNvPr id="1" name=""/>
+        <p:cNvGrpSpPr/>
+        <p:nvPr/>
+      </p:nvGrpSpPr>
+      <p:grpSpPr>
+        <a:xfrm>
+          <a:off x="0" y="0"/>
+          <a:ext cx="0" cy="0"/>
+          <a:chOff x="0" y="0"/>
+          <a:chExt cx="0" cy="0"/>
+        </a:xfrm>
+      </p:grpSpPr>
       <p:sp>
         <p:nvSpPr>
           <p:cNvPr id="2" name="Title 1">
@@ -7101,7 +8191,7 @@
 </p:sld>
 </file>
 
-<file path=ppt/slides/slide15.xml><?xml version="1.0" encoding="utf-8"?>
+<file path=ppt/slides/slide18.xml><?xml version="1.0" encoding="utf-8"?>
 <p:sld xmlns:a="http://schemas.openxmlformats.org/drawingml/2006/main" xmlns:r="http://schemas.openxmlformats.org/officeDocument/2006/relationships" xmlns:p="http://schemas.openxmlformats.org/presentationml/2006/main">
   <p:cSld>
     <p:spTree>
@@ -9783,4 +10873,299 @@
     </a:ext>
   </a:extLst>
 </a:theme>
+</file>
+
+<file path=ppt/theme/theme2.xml><?xml version="1.0" encoding="utf-8"?>
+<a:theme xmlns:a="http://schemas.openxmlformats.org/drawingml/2006/main" name="Office Theme">
+  <a:themeElements>
+    <a:clrScheme name="Office">
+      <a:dk1>
+        <a:sysClr val="windowText" lastClr="000000"/>
+      </a:dk1>
+      <a:lt1>
+        <a:sysClr val="window" lastClr="FFFFFF"/>
+      </a:lt1>
+      <a:dk2>
+        <a:srgbClr val="44546A"/>
+      </a:dk2>
+      <a:lt2>
+        <a:srgbClr val="E7E6E6"/>
+      </a:lt2>
+      <a:accent1>
+        <a:srgbClr val="4472C4"/>
+      </a:accent1>
+      <a:accent2>
+        <a:srgbClr val="ED7D31"/>
+      </a:accent2>
+      <a:accent3>
+        <a:srgbClr val="A5A5A5"/>
+      </a:accent3>
+      <a:accent4>
+        <a:srgbClr val="FFC000"/>
+      </a:accent4>
+      <a:accent5>
+        <a:srgbClr val="5B9BD5"/>
+      </a:accent5>
+      <a:accent6>
+        <a:srgbClr val="70AD47"/>
+      </a:accent6>
+      <a:hlink>
+        <a:srgbClr val="0563C1"/>
+      </a:hlink>
+      <a:folHlink>
+        <a:srgbClr val="954F72"/>
+      </a:folHlink>
+    </a:clrScheme>
+    <a:fontScheme name="Office">
+      <a:majorFont>
+        <a:latin typeface="Calibri Light" panose="020F0302020204030204"/>
+        <a:ea typeface=""/>
+        <a:cs typeface=""/>
+        <a:font script="Jpan" typeface="游ゴシック Light"/>
+        <a:font script="Hang" typeface="맑은 고딕"/>
+        <a:font script="Hans" typeface="等线 Light"/>
+        <a:font script="Hant" typeface="新細明體"/>
+        <a:font script="Arab" typeface="Times New Roman"/>
+        <a:font script="Hebr" typeface="Times New Roman"/>
+        <a:font script="Thai" typeface="Angsana New"/>
+        <a:font script="Ethi" typeface="Nyala"/>
+        <a:font script="Beng" typeface="Vrinda"/>
+        <a:font script="Gujr" typeface="Shruti"/>
+        <a:font script="Khmr" typeface="MoolBoran"/>
+        <a:font script="Knda" typeface="Tunga"/>
+        <a:font script="Guru" typeface="Raavi"/>
+        <a:font script="Cans" typeface="Euphemia"/>
+        <a:font script="Cher" typeface="Plantagenet Cherokee"/>
+        <a:font script="Yiii" typeface="Microsoft Yi Baiti"/>
+        <a:font script="Tibt" typeface="Microsoft Himalaya"/>
+        <a:font script="Thaa" typeface="MV Boli"/>
+        <a:font script="Deva" typeface="Mangal"/>
+        <a:font script="Telu" typeface="Gautami"/>
+        <a:font script="Taml" typeface="Latha"/>
+        <a:font script="Syrc" typeface="Estrangelo Edessa"/>
+        <a:font script="Orya" typeface="Kalinga"/>
+        <a:font script="Mlym" typeface="Kartika"/>
+        <a:font script="Laoo" typeface="DokChampa"/>
+        <a:font script="Sinh" typeface="Iskoola Pota"/>
+        <a:font script="Mong" typeface="Mongolian Baiti"/>
+        <a:font script="Viet" typeface="Times New Roman"/>
+        <a:font script="Uigh" typeface="Microsoft Uighur"/>
+        <a:font script="Geor" typeface="Sylfaen"/>
+        <a:font script="Armn" typeface="Arial"/>
+        <a:font script="Bugi" typeface="Leelawadee UI"/>
+        <a:font script="Bopo" typeface="Microsoft JhengHei"/>
+        <a:font script="Java" typeface="Javanese Text"/>
+        <a:font script="Lisu" typeface="Segoe UI"/>
+        <a:font script="Mymr" typeface="Myanmar Text"/>
+        <a:font script="Nkoo" typeface="Ebrima"/>
+        <a:font script="Olck" typeface="Nirmala UI"/>
+        <a:font script="Osma" typeface="Ebrima"/>
+        <a:font script="Phag" typeface="Phagspa"/>
+        <a:font script="Syrn" typeface="Estrangelo Edessa"/>
+        <a:font script="Syrj" typeface="Estrangelo Edessa"/>
+        <a:font script="Syre" typeface="Estrangelo Edessa"/>
+        <a:font script="Sora" typeface="Nirmala UI"/>
+        <a:font script="Tale" typeface="Microsoft Tai Le"/>
+        <a:font script="Talu" typeface="Microsoft New Tai Lue"/>
+        <a:font script="Tfng" typeface="Ebrima"/>
+      </a:majorFont>
+      <a:minorFont>
+        <a:latin typeface="Calibri" panose="020F0502020204030204"/>
+        <a:ea typeface=""/>
+        <a:cs typeface=""/>
+        <a:font script="Jpan" typeface="游ゴシック"/>
+        <a:font script="Hang" typeface="맑은 고딕"/>
+        <a:font script="Hans" typeface="等线"/>
+        <a:font script="Hant" typeface="新細明體"/>
+        <a:font script="Arab" typeface="Arial"/>
+        <a:font script="Hebr" typeface="Arial"/>
+        <a:font script="Thai" typeface="Cordia New"/>
+        <a:font script="Ethi" typeface="Nyala"/>
+        <a:font script="Beng" typeface="Vrinda"/>
+        <a:font script="Gujr" typeface="Shruti"/>
+        <a:font script="Khmr" typeface="DaunPenh"/>
+        <a:font script="Knda" typeface="Tunga"/>
+        <a:font script="Guru" typeface="Raavi"/>
+        <a:font script="Cans" typeface="Euphemia"/>
+        <a:font script="Cher" typeface="Plantagenet Cherokee"/>
+        <a:font script="Yiii" typeface="Microsoft Yi Baiti"/>
+        <a:font script="Tibt" typeface="Microsoft Himalaya"/>
+        <a:font script="Thaa" typeface="MV Boli"/>
+        <a:font script="Deva" typeface="Mangal"/>
+        <a:font script="Telu" typeface="Gautami"/>
+        <a:font script="Taml" typeface="Latha"/>
+        <a:font script="Syrc" typeface="Estrangelo Edessa"/>
+        <a:font script="Orya" typeface="Kalinga"/>
+        <a:font script="Mlym" typeface="Kartika"/>
+        <a:font script="Laoo" typeface="DokChampa"/>
+        <a:font script="Sinh" typeface="Iskoola Pota"/>
+        <a:font script="Mong" typeface="Mongolian Baiti"/>
+        <a:font script="Viet" typeface="Arial"/>
+        <a:font script="Uigh" typeface="Microsoft Uighur"/>
+        <a:font script="Geor" typeface="Sylfaen"/>
+        <a:font script="Armn" typeface="Arial"/>
+        <a:font script="Bugi" typeface="Leelawadee UI"/>
+        <a:font script="Bopo" typeface="Microsoft JhengHei"/>
+        <a:font script="Java" typeface="Javanese Text"/>
+        <a:font script="Lisu" typeface="Segoe UI"/>
+        <a:font script="Mymr" typeface="Myanmar Text"/>
+        <a:font script="Nkoo" typeface="Ebrima"/>
+        <a:font script="Olck" typeface="Nirmala UI"/>
+        <a:font script="Osma" typeface="Ebrima"/>
+        <a:font script="Phag" typeface="Phagspa"/>
+        <a:font script="Syrn" typeface="Estrangelo Edessa"/>
+        <a:font script="Syrj" typeface="Estrangelo Edessa"/>
+        <a:font script="Syre" typeface="Estrangelo Edessa"/>
+        <a:font script="Sora" typeface="Nirmala UI"/>
+        <a:font script="Tale" typeface="Microsoft Tai Le"/>
+        <a:font script="Talu" typeface="Microsoft New Tai Lue"/>
+        <a:font script="Tfng" typeface="Ebrima"/>
+      </a:minorFont>
+    </a:fontScheme>
+    <a:fmtScheme name="Office">
+      <a:fillStyleLst>
+        <a:solidFill>
+          <a:schemeClr val="phClr"/>
+        </a:solidFill>
+        <a:gradFill rotWithShape="1">
+          <a:gsLst>
+            <a:gs pos="0">
+              <a:schemeClr val="phClr">
+                <a:lumMod val="110000"/>
+                <a:satMod val="105000"/>
+                <a:tint val="67000"/>
+              </a:schemeClr>
+            </a:gs>
+            <a:gs pos="50000">
+              <a:schemeClr val="phClr">
+                <a:lumMod val="105000"/>
+                <a:satMod val="103000"/>
+                <a:tint val="73000"/>
+              </a:schemeClr>
+            </a:gs>
+            <a:gs pos="100000">
+              <a:schemeClr val="phClr">
+                <a:lumMod val="105000"/>
+                <a:satMod val="109000"/>
+                <a:tint val="81000"/>
+              </a:schemeClr>
+            </a:gs>
+          </a:gsLst>
+          <a:lin ang="5400000" scaled="0"/>
+        </a:gradFill>
+        <a:gradFill rotWithShape="1">
+          <a:gsLst>
+            <a:gs pos="0">
+              <a:schemeClr val="phClr">
+                <a:satMod val="103000"/>
+                <a:lumMod val="102000"/>
+                <a:tint val="94000"/>
+              </a:schemeClr>
+            </a:gs>
+            <a:gs pos="50000">
+              <a:schemeClr val="phClr">
+                <a:satMod val="110000"/>
+                <a:lumMod val="100000"/>
+                <a:shade val="100000"/>
+              </a:schemeClr>
+            </a:gs>
+            <a:gs pos="100000">
+              <a:schemeClr val="phClr">
+                <a:lumMod val="99000"/>
+                <a:satMod val="120000"/>
+                <a:shade val="78000"/>
+              </a:schemeClr>
+            </a:gs>
+          </a:gsLst>
+          <a:lin ang="5400000" scaled="0"/>
+        </a:gradFill>
+      </a:fillStyleLst>
+      <a:lnStyleLst>
+        <a:ln w="6350" cap="flat" cmpd="sng" algn="ctr">
+          <a:solidFill>
+            <a:schemeClr val="phClr"/>
+          </a:solidFill>
+          <a:prstDash val="solid"/>
+          <a:miter lim="800000"/>
+        </a:ln>
+        <a:ln w="12700" cap="flat" cmpd="sng" algn="ctr">
+          <a:solidFill>
+            <a:schemeClr val="phClr"/>
+          </a:solidFill>
+          <a:prstDash val="solid"/>
+          <a:miter lim="800000"/>
+        </a:ln>
+        <a:ln w="19050" cap="flat" cmpd="sng" algn="ctr">
+          <a:solidFill>
+            <a:schemeClr val="phClr"/>
+          </a:solidFill>
+          <a:prstDash val="solid"/>
+          <a:miter lim="800000"/>
+        </a:ln>
+      </a:lnStyleLst>
+      <a:effectStyleLst>
+        <a:effectStyle>
+          <a:effectLst/>
+        </a:effectStyle>
+        <a:effectStyle>
+          <a:effectLst/>
+        </a:effectStyle>
+        <a:effectStyle>
+          <a:effectLst>
+            <a:outerShdw blurRad="57150" dist="19050" dir="5400000" algn="ctr" rotWithShape="0">
+              <a:srgbClr val="000000">
+                <a:alpha val="63000"/>
+              </a:srgbClr>
+            </a:outerShdw>
+          </a:effectLst>
+        </a:effectStyle>
+      </a:effectStyleLst>
+      <a:bgFillStyleLst>
+        <a:solidFill>
+          <a:schemeClr val="phClr"/>
+        </a:solidFill>
+        <a:solidFill>
+          <a:schemeClr val="phClr">
+            <a:tint val="95000"/>
+            <a:satMod val="170000"/>
+          </a:schemeClr>
+        </a:solidFill>
+        <a:gradFill rotWithShape="1">
+          <a:gsLst>
+            <a:gs pos="0">
+              <a:schemeClr val="phClr">
+                <a:tint val="93000"/>
+                <a:satMod val="150000"/>
+                <a:shade val="98000"/>
+                <a:lumMod val="102000"/>
+              </a:schemeClr>
+            </a:gs>
+            <a:gs pos="50000">
+              <a:schemeClr val="phClr">
+                <a:tint val="98000"/>
+                <a:satMod val="130000"/>
+                <a:shade val="90000"/>
+                <a:lumMod val="103000"/>
+              </a:schemeClr>
+            </a:gs>
+            <a:gs pos="100000">
+              <a:schemeClr val="phClr">
+                <a:shade val="63000"/>
+                <a:satMod val="120000"/>
+              </a:schemeClr>
+            </a:gs>
+          </a:gsLst>
+          <a:lin ang="5400000" scaled="0"/>
+        </a:gradFill>
+      </a:bgFillStyleLst>
+    </a:fmtScheme>
+  </a:themeElements>
+  <a:objectDefaults/>
+  <a:extraClrSchemeLst/>
+  <a:extLst>
+    <a:ext uri="{05A4C25C-085E-4340-85A3-A5531E510DB2}">
+      <thm15:themeFamily xmlns:thm15="http://schemas.microsoft.com/office/thememl/2012/main" name="Office Theme" id="{62F939B6-93AF-4DB8-9C6B-D6C7DFDC589F}" vid="{4A3C46E8-61CC-4603-A589-7422A47A8E4A}"/>
+    </a:ext>
+  </a:extLst>
+</a:theme>
 </file>
</xml_diff>

<commit_message>
Updated at 2:30PM 07/04
Latest version PPT
</commit_message>
<xml_diff>
--- a/DataDynamos_BeerMarketingPresentation.pptx
+++ b/DataDynamos_BeerMarketingPresentation.pptx
@@ -6868,10 +6868,10 @@
       </p:sp>
       <p:pic>
         <p:nvPicPr>
-          <p:cNvPr id="9" name="Picture 8">
+          <p:cNvPr id="4" name="Picture 3">
             <a:extLst>
               <a:ext uri="{FF2B5EF4-FFF2-40B4-BE49-F238E27FC236}">
-                <a16:creationId xmlns:a16="http://schemas.microsoft.com/office/drawing/2014/main" id="{556C08EC-28CF-3B46-BA9A-25CFFAF96480}"/>
+                <a16:creationId xmlns:a16="http://schemas.microsoft.com/office/drawing/2014/main" id="{03DADA65-C42E-894D-9669-ACFF79DF3D9E}"/>
               </a:ext>
             </a:extLst>
           </p:cNvPr>
@@ -6888,8 +6888,8 @@
         </p:blipFill>
         <p:spPr>
           <a:xfrm>
-            <a:off x="6675064" y="3855045"/>
-            <a:ext cx="4569199" cy="2949725"/>
+            <a:off x="6675064" y="1073745"/>
+            <a:ext cx="4495800" cy="2781300"/>
           </a:xfrm>
           <a:prstGeom prst="rect">
             <a:avLst/>
@@ -6898,10 +6898,10 @@
       </p:pic>
       <p:pic>
         <p:nvPicPr>
-          <p:cNvPr id="11" name="Content Placeholder 3">
+          <p:cNvPr id="5" name="Picture 4">
             <a:extLst>
               <a:ext uri="{FF2B5EF4-FFF2-40B4-BE49-F238E27FC236}">
-                <a16:creationId xmlns:a16="http://schemas.microsoft.com/office/drawing/2014/main" id="{64BB5902-8FC3-904C-B203-8F2770CD49F1}"/>
+                <a16:creationId xmlns:a16="http://schemas.microsoft.com/office/drawing/2014/main" id="{1F95E0BE-138B-6F43-A87D-B5540D5CFFB4}"/>
               </a:ext>
             </a:extLst>
           </p:cNvPr>
@@ -6918,8 +6918,8 @@
         </p:blipFill>
         <p:spPr>
           <a:xfrm>
-            <a:off x="6654273" y="905977"/>
-            <a:ext cx="4589990" cy="2949068"/>
+            <a:off x="6738564" y="3855045"/>
+            <a:ext cx="4432300" cy="2882900"/>
           </a:xfrm>
           <a:prstGeom prst="rect">
             <a:avLst/>
@@ -6928,10 +6928,10 @@
       </p:pic>
       <p:pic>
         <p:nvPicPr>
-          <p:cNvPr id="3" name="Picture 2">
+          <p:cNvPr id="7" name="Picture 6">
             <a:extLst>
               <a:ext uri="{FF2B5EF4-FFF2-40B4-BE49-F238E27FC236}">
-                <a16:creationId xmlns:a16="http://schemas.microsoft.com/office/drawing/2014/main" id="{686CBFCC-531C-0B42-B77C-57224A785378}"/>
+                <a16:creationId xmlns:a16="http://schemas.microsoft.com/office/drawing/2014/main" id="{3040AC46-F25B-2044-8115-559A53EA6DE5}"/>
               </a:ext>
             </a:extLst>
           </p:cNvPr>
@@ -6948,8 +6948,8 @@
         </p:blipFill>
         <p:spPr>
           <a:xfrm>
-            <a:off x="210365" y="2493654"/>
-            <a:ext cx="6142961" cy="3797785"/>
+            <a:off x="578058" y="2553294"/>
+            <a:ext cx="5951330" cy="3651953"/>
           </a:xfrm>
           <a:prstGeom prst="rect">
             <a:avLst/>
@@ -7210,12 +7210,8 @@
           <a:lstStyle/>
           <a:p>
             <a:r>
-              <a:rPr lang="en-US" u="sng" dirty="0" err="1"/>
-              <a:t>Identifing</a:t>
-            </a:r>
-            <a:r>
               <a:rPr lang="en-US" u="sng" dirty="0"/>
-              <a:t> New Market Opportunities</a:t>
+              <a:t>Identifying New Market Opportunities</a:t>
             </a:r>
           </a:p>
         </p:txBody>
@@ -7486,39 +7482,7 @@
                   <a:srgbClr val="0070C0"/>
                 </a:solidFill>
               </a:rPr>
-              <a:t>In order to find the opportunities from this data, first we checked these relationships </a:t>
-            </a:r>
-            <a:r>
-              <a:rPr lang="en-US" sz="1600" dirty="0" err="1">
-                <a:solidFill>
-                  <a:srgbClr val="0070C0"/>
-                </a:solidFill>
-              </a:rPr>
-              <a:t>winthin</a:t>
-            </a:r>
-            <a:r>
-              <a:rPr lang="en-US" sz="1600" dirty="0">
-                <a:solidFill>
-                  <a:srgbClr val="0070C0"/>
-                </a:solidFill>
-              </a:rPr>
-              <a:t> different variables. We would like to predict if there are some </a:t>
-            </a:r>
-            <a:r>
-              <a:rPr lang="en-US" sz="1600" dirty="0" err="1">
-                <a:solidFill>
-                  <a:srgbClr val="0070C0"/>
-                </a:solidFill>
-              </a:rPr>
-              <a:t>relathinship</a:t>
-            </a:r>
-            <a:r>
-              <a:rPr lang="en-US" sz="1600" dirty="0">
-                <a:solidFill>
-                  <a:srgbClr val="0070C0"/>
-                </a:solidFill>
-              </a:rPr>
-              <a:t> within Income, Population, beer type.</a:t>
+              <a:t>In order to find the opportunities from this data, first we checked these relationships within different variables. We would like to predict if there are some relationships within Income, Population, beer type.</a:t>
             </a:r>
           </a:p>
         </p:txBody>
@@ -7678,8 +7642,8 @@
         </p:nvSpPr>
         <p:spPr>
           <a:xfrm>
-            <a:off x="351061" y="1138576"/>
-            <a:ext cx="3495964" cy="5601533"/>
+            <a:off x="459620" y="1324946"/>
+            <a:ext cx="3495964" cy="4832092"/>
           </a:xfrm>
           <a:prstGeom prst="rect">
             <a:avLst/>
@@ -7697,7 +7661,7 @@
               <a:buChar char="v"/>
             </a:pPr>
             <a:r>
-              <a:rPr lang="en-US" sz="2600" dirty="0">
+              <a:rPr lang="en-US" sz="2400" dirty="0">
                 <a:solidFill>
                   <a:srgbClr val="0070C0"/>
                 </a:solidFill>
@@ -7711,7 +7675,7 @@
               <a:buChar char="v"/>
             </a:pPr>
             <a:r>
-              <a:rPr lang="en-US" sz="2600" dirty="0">
+              <a:rPr lang="en-US" sz="2400" dirty="0">
                 <a:solidFill>
                   <a:srgbClr val="0070C0"/>
                 </a:solidFill>
@@ -7918,8 +7882,8 @@
         </p:nvSpPr>
         <p:spPr>
           <a:xfrm>
-            <a:off x="183850" y="904728"/>
-            <a:ext cx="11629446" cy="2000548"/>
+            <a:off x="152319" y="789115"/>
+            <a:ext cx="9548729" cy="2246769"/>
           </a:xfrm>
           <a:prstGeom prst="rect">
             <a:avLst/>
@@ -7933,11 +7897,14 @@
           <a:lstStyle/>
           <a:p>
             <a:pPr marL="457200" indent="-457200">
+              <a:lnSpc>
+                <a:spcPct val="150000"/>
+              </a:lnSpc>
               <a:buFont typeface="Wingdings" panose="05000000000000000000" pitchFamily="2" charset="2"/>
               <a:buChar char="v"/>
             </a:pPr>
             <a:r>
-              <a:rPr lang="en-US" sz="2600" dirty="0">
+              <a:rPr lang="en-US" sz="2000" dirty="0">
                 <a:solidFill>
                   <a:srgbClr val="0070C0"/>
                 </a:solidFill>
@@ -7947,11 +7914,14 @@
           </a:p>
           <a:p>
             <a:pPr marL="457200" indent="-457200">
+              <a:lnSpc>
+                <a:spcPct val="150000"/>
+              </a:lnSpc>
               <a:buFont typeface="Wingdings" panose="05000000000000000000" pitchFamily="2" charset="2"/>
               <a:buChar char="v"/>
             </a:pPr>
             <a:r>
-              <a:rPr lang="en-US" sz="2600" dirty="0">
+              <a:rPr lang="en-US" sz="2000" dirty="0">
                 <a:solidFill>
                   <a:srgbClr val="0070C0"/>
                 </a:solidFill>
@@ -8012,17 +7982,19 @@
         </p:nvSpPr>
         <p:spPr>
           <a:xfrm>
-            <a:off x="192142" y="373483"/>
-            <a:ext cx="9729409" cy="1320800"/>
-          </a:xfrm>
-        </p:spPr>
-        <p:txBody>
-          <a:bodyPr/>
-          <a:lstStyle/>
-          <a:p>
-            <a:r>
-              <a:rPr lang="en-US" u="sng" dirty="0"/>
-              <a:t>What do we Sell to the Underserved States?</a:t>
+            <a:off x="192143" y="373483"/>
+            <a:ext cx="9109512" cy="484344"/>
+          </a:xfrm>
+        </p:spPr>
+        <p:txBody>
+          <a:bodyPr>
+            <a:noAutofit/>
+          </a:bodyPr>
+          <a:lstStyle/>
+          <a:p>
+            <a:r>
+              <a:rPr lang="en-US" sz="3200" u="sng" dirty="0"/>
+              <a:t>Conclusion: Sell Cider in the Southern Sates</a:t>
             </a:r>
           </a:p>
         </p:txBody>
@@ -8118,8 +8090,8 @@
         </p:nvSpPr>
         <p:spPr>
           <a:xfrm>
-            <a:off x="0" y="1140280"/>
-            <a:ext cx="4686730" cy="5201424"/>
+            <a:off x="0" y="1445080"/>
+            <a:ext cx="4686730" cy="4555093"/>
           </a:xfrm>
           <a:prstGeom prst="rect">
             <a:avLst/>
@@ -8133,11 +8105,14 @@
           <a:lstStyle/>
           <a:p>
             <a:pPr marL="457200" indent="-457200">
+              <a:lnSpc>
+                <a:spcPct val="150000"/>
+              </a:lnSpc>
               <a:buFont typeface="Wingdings" panose="05000000000000000000" pitchFamily="2" charset="2"/>
               <a:buChar char="v"/>
             </a:pPr>
             <a:r>
-              <a:rPr lang="en-US" sz="2600" dirty="0">
+              <a:rPr lang="en-US" sz="2000" dirty="0">
                 <a:solidFill>
                   <a:srgbClr val="0070C0"/>
                 </a:solidFill>
@@ -8147,25 +8122,47 @@
           </a:p>
           <a:p>
             <a:pPr marL="457200" indent="-457200">
+              <a:lnSpc>
+                <a:spcPct val="150000"/>
+              </a:lnSpc>
               <a:buFont typeface="Wingdings" panose="05000000000000000000" pitchFamily="2" charset="2"/>
               <a:buChar char="v"/>
             </a:pPr>
             <a:r>
-              <a:rPr lang="en-US" sz="2600" dirty="0">
+              <a:rPr lang="en-US" sz="2000" dirty="0">
                 <a:solidFill>
                   <a:srgbClr val="0070C0"/>
                 </a:solidFill>
               </a:rPr>
-              <a:t>However, the most notable exception is Cider, which is not present in any of the target states.</a:t>
+              <a:t>However, the most notable exception is </a:t>
+            </a:r>
+            <a:r>
+              <a:rPr lang="en-US" sz="2000" b="1" dirty="0">
+                <a:solidFill>
+                  <a:srgbClr val="0070C0"/>
+                </a:solidFill>
+              </a:rPr>
+              <a:t>Cider</a:t>
+            </a:r>
+            <a:r>
+              <a:rPr lang="en-US" sz="2000" dirty="0">
+                <a:solidFill>
+                  <a:srgbClr val="0070C0"/>
+                </a:solidFill>
+              </a:rPr>
+              <a:t>, which is not present in any of the target states.</a:t>
             </a:r>
           </a:p>
           <a:p>
             <a:pPr marL="457200" indent="-457200">
+              <a:lnSpc>
+                <a:spcPct val="150000"/>
+              </a:lnSpc>
               <a:buFont typeface="Wingdings" panose="05000000000000000000" pitchFamily="2" charset="2"/>
               <a:buChar char="v"/>
             </a:pPr>
             <a:r>
-              <a:rPr lang="en-US" sz="2600" dirty="0">
+              <a:rPr lang="en-US" sz="2000" dirty="0">
                 <a:solidFill>
                   <a:srgbClr val="0070C0"/>
                 </a:solidFill>
@@ -8909,8 +8906,8 @@
         </p:nvSpPr>
         <p:spPr>
           <a:xfrm rot="19918113">
-            <a:off x="4513792" y="4234455"/>
-            <a:ext cx="1593716" cy="724184"/>
+            <a:off x="4532219" y="4308276"/>
+            <a:ext cx="1293993" cy="720579"/>
           </a:xfrm>
           <a:prstGeom prst="rightArrow">
             <a:avLst/>
@@ -8943,44 +8940,6 @@
       </p:sp>
       <p:pic>
         <p:nvPicPr>
-          <p:cNvPr id="9" name="Picture 8">
-            <a:extLst>
-              <a:ext uri="{FF2B5EF4-FFF2-40B4-BE49-F238E27FC236}">
-                <a16:creationId xmlns:a16="http://schemas.microsoft.com/office/drawing/2014/main" id="{54BF22D5-6D65-432C-9A93-9B7A516EFA7B}"/>
-              </a:ext>
-            </a:extLst>
-          </p:cNvPr>
-          <p:cNvPicPr>
-            <a:picLocks noChangeAspect="1"/>
-          </p:cNvPicPr>
-          <p:nvPr/>
-        </p:nvPicPr>
-        <p:blipFill>
-          <a:blip r:embed="rId2"/>
-          <a:stretch>
-            <a:fillRect/>
-          </a:stretch>
-        </p:blipFill>
-        <p:spPr>
-          <a:xfrm>
-            <a:off x="6243081" y="1410743"/>
-            <a:ext cx="5529943" cy="4312276"/>
-          </a:xfrm>
-          <a:prstGeom prst="rect">
-            <a:avLst/>
-          </a:prstGeom>
-          <a:effectLst>
-            <a:glow rad="63500">
-              <a:srgbClr val="FF0000">
-                <a:alpha val="50000"/>
-              </a:srgbClr>
-            </a:glow>
-            <a:reflection stA="45000" endPos="0" dir="5400000" sy="-100000" algn="bl" rotWithShape="0"/>
-          </a:effectLst>
-        </p:spPr>
-      </p:pic>
-      <p:pic>
-        <p:nvPicPr>
           <p:cNvPr id="10" name="Picture 2" descr="Image result for budweiser logo">
             <a:extLst>
               <a:ext uri="{FF2B5EF4-FFF2-40B4-BE49-F238E27FC236}">
@@ -8994,12 +8953,12 @@
           <p:nvPr/>
         </p:nvPicPr>
         <p:blipFill>
-          <a:blip r:embed="rId3">
+          <a:blip r:embed="rId2">
             <a:alphaModFix amt="58000"/>
             <a:extLst>
               <a:ext uri="{BEBA8EAE-BF5A-486C-A8C5-ECC9F3942E4B}">
                 <a14:imgProps xmlns:a14="http://schemas.microsoft.com/office/drawing/2010/main">
-                  <a14:imgLayer r:embed="rId4">
+                  <a14:imgLayer r:embed="rId3">
                     <a14:imgEffect>
                       <a14:colorTemperature colorTemp="6972"/>
                     </a14:imgEffect>
@@ -9037,6 +8996,36 @@
               </a14:hiddenFill>
             </a:ext>
           </a:extLst>
+        </p:spPr>
+      </p:pic>
+      <p:pic>
+        <p:nvPicPr>
+          <p:cNvPr id="2" name="Picture 1">
+            <a:extLst>
+              <a:ext uri="{FF2B5EF4-FFF2-40B4-BE49-F238E27FC236}">
+                <a16:creationId xmlns:a16="http://schemas.microsoft.com/office/drawing/2014/main" id="{F7C0026E-DB8A-014F-94D7-3E7D19C174ED}"/>
+              </a:ext>
+            </a:extLst>
+          </p:cNvPr>
+          <p:cNvPicPr>
+            <a:picLocks noChangeAspect="1"/>
+          </p:cNvPicPr>
+          <p:nvPr/>
+        </p:nvPicPr>
+        <p:blipFill>
+          <a:blip r:embed="rId4"/>
+          <a:stretch>
+            <a:fillRect/>
+          </a:stretch>
+        </p:blipFill>
+        <p:spPr>
+          <a:xfrm>
+            <a:off x="5919633" y="1314825"/>
+            <a:ext cx="5900939" cy="3681782"/>
+          </a:xfrm>
+          <a:prstGeom prst="rect">
+            <a:avLst/>
+          </a:prstGeom>
         </p:spPr>
       </p:pic>
     </p:spTree>
@@ -9230,7 +9219,7 @@
         </p:blipFill>
         <p:spPr>
           <a:xfrm>
-            <a:off x="361246" y="2106620"/>
+            <a:off x="361246" y="2117130"/>
             <a:ext cx="3547533" cy="4396214"/>
           </a:xfrm>
           <a:prstGeom prst="rect">

</xml_diff>